<commit_message>
a bit more on methylation
</commit_message>
<xml_diff>
--- a/KipnisLabMeeting_2017-03-13.pptx
+++ b/KipnisLabMeeting_2017-03-13.pptx
@@ -8,11 +8,17 @@
     <p:sldId id="256" r:id="rId2"/>
     <p:sldId id="257" r:id="rId3"/>
     <p:sldId id="258" r:id="rId4"/>
-    <p:sldId id="259" r:id="rId5"/>
-    <p:sldId id="260" r:id="rId6"/>
-    <p:sldId id="261" r:id="rId7"/>
-    <p:sldId id="262" r:id="rId8"/>
-    <p:sldId id="263" r:id="rId9"/>
+    <p:sldId id="269" r:id="rId5"/>
+    <p:sldId id="259" r:id="rId6"/>
+    <p:sldId id="271" r:id="rId7"/>
+    <p:sldId id="260" r:id="rId8"/>
+    <p:sldId id="261" r:id="rId9"/>
+    <p:sldId id="262" r:id="rId10"/>
+    <p:sldId id="266" r:id="rId11"/>
+    <p:sldId id="263" r:id="rId12"/>
+    <p:sldId id="267" r:id="rId13"/>
+    <p:sldId id="270" r:id="rId14"/>
+    <p:sldId id="268" r:id="rId15"/>
   </p:sldIdLst>
   <p:sldSz cx="9144000" cy="6858000" type="screen4x3"/>
   <p:notesSz cx="6858000" cy="9144000"/>
@@ -3738,6 +3744,684 @@
 </p:sld>
 </file>
 
+<file path=ppt/slides/slide10.xml><?xml version="1.0" encoding="utf-8"?>
+<p:sld xmlns:a="http://schemas.openxmlformats.org/drawingml/2006/main" xmlns:r="http://schemas.openxmlformats.org/officeDocument/2006/relationships" xmlns:p="http://schemas.openxmlformats.org/presentationml/2006/main">
+  <p:cSld>
+    <p:spTree>
+      <p:nvGrpSpPr>
+        <p:cNvPr id="1" name=""/>
+        <p:cNvGrpSpPr/>
+        <p:nvPr/>
+      </p:nvGrpSpPr>
+      <p:grpSpPr>
+        <a:xfrm>
+          <a:off x="0" y="0"/>
+          <a:ext cx="0" cy="0"/>
+          <a:chOff x="0" y="0"/>
+          <a:chExt cx="0" cy="0"/>
+        </a:xfrm>
+      </p:grpSpPr>
+      <p:sp>
+        <p:nvSpPr>
+          <p:cNvPr id="2" name="Title 1"/>
+          <p:cNvSpPr>
+            <a:spLocks noGrp="1"/>
+          </p:cNvSpPr>
+          <p:nvPr>
+            <p:ph type="title"/>
+          </p:nvPr>
+        </p:nvSpPr>
+        <p:spPr/>
+        <p:txBody>
+          <a:bodyPr/>
+          <a:lstStyle/>
+          <a:p>
+            <a:r>
+              <a:rPr lang="en-US" dirty="0" smtClean="0"/>
+              <a:t>Histone modifications</a:t>
+            </a:r>
+            <a:endParaRPr lang="en-US" dirty="0"/>
+          </a:p>
+        </p:txBody>
+      </p:sp>
+      <p:sp>
+        <p:nvSpPr>
+          <p:cNvPr id="3" name="Content Placeholder 2"/>
+          <p:cNvSpPr>
+            <a:spLocks noGrp="1"/>
+          </p:cNvSpPr>
+          <p:nvPr>
+            <p:ph idx="1"/>
+          </p:nvPr>
+        </p:nvSpPr>
+        <p:spPr/>
+        <p:txBody>
+          <a:bodyPr/>
+          <a:lstStyle/>
+          <a:p>
+            <a:r>
+              <a:rPr lang="en-US" dirty="0" smtClean="0"/>
+              <a:t>Location</a:t>
+            </a:r>
+            <a:r>
+              <a:rPr lang="en-US" dirty="0"/>
+              <a:t>-dependent</a:t>
+            </a:r>
+          </a:p>
+          <a:p>
+            <a:pPr lvl="1"/>
+            <a:r>
+              <a:rPr lang="en-US" dirty="0" smtClean="0"/>
+              <a:t>H3K4me1 at enhancer</a:t>
+            </a:r>
+          </a:p>
+          <a:p>
+            <a:pPr lvl="1"/>
+            <a:r>
+              <a:rPr lang="en-US" dirty="0" smtClean="0"/>
+              <a:t>H3K4me3 at promoter</a:t>
+            </a:r>
+          </a:p>
+          <a:p>
+            <a:pPr lvl="1"/>
+            <a:endParaRPr lang="en-US" dirty="0"/>
+          </a:p>
+          <a:p>
+            <a:r>
+              <a:rPr lang="en-US" dirty="0" smtClean="0"/>
+              <a:t>Acetylation on tails general an activation mark</a:t>
+            </a:r>
+            <a:endParaRPr lang="en-US" dirty="0"/>
+          </a:p>
+          <a:p>
+            <a:endParaRPr lang="en-US" dirty="0"/>
+          </a:p>
+        </p:txBody>
+      </p:sp>
+    </p:spTree>
+    <p:extLst>
+      <p:ext uri="{BB962C8B-B14F-4D97-AF65-F5344CB8AC3E}">
+        <p14:creationId xmlns:p14="http://schemas.microsoft.com/office/powerpoint/2010/main" val="2882511342"/>
+      </p:ext>
+    </p:extLst>
+  </p:cSld>
+  <p:clrMapOvr>
+    <a:masterClrMapping/>
+  </p:clrMapOvr>
+</p:sld>
+</file>
+
+<file path=ppt/slides/slide11.xml><?xml version="1.0" encoding="utf-8"?>
+<p:sld xmlns:a="http://schemas.openxmlformats.org/drawingml/2006/main" xmlns:r="http://schemas.openxmlformats.org/officeDocument/2006/relationships" xmlns:p="http://schemas.openxmlformats.org/presentationml/2006/main">
+  <p:cSld>
+    <p:spTree>
+      <p:nvGrpSpPr>
+        <p:cNvPr id="1" name=""/>
+        <p:cNvGrpSpPr/>
+        <p:nvPr/>
+      </p:nvGrpSpPr>
+      <p:grpSpPr>
+        <a:xfrm>
+          <a:off x="0" y="0"/>
+          <a:ext cx="0" cy="0"/>
+          <a:chOff x="0" y="0"/>
+          <a:chExt cx="0" cy="0"/>
+        </a:xfrm>
+      </p:grpSpPr>
+      <p:sp>
+        <p:nvSpPr>
+          <p:cNvPr id="2" name="Title 1"/>
+          <p:cNvSpPr>
+            <a:spLocks noGrp="1"/>
+          </p:cNvSpPr>
+          <p:nvPr>
+            <p:ph type="title"/>
+          </p:nvPr>
+        </p:nvSpPr>
+        <p:spPr/>
+        <p:txBody>
+          <a:bodyPr/>
+          <a:lstStyle/>
+          <a:p>
+            <a:r>
+              <a:rPr lang="en-US" sz="3200" dirty="0" smtClean="0"/>
+              <a:t>Whole-genome vs. Reduced-representation</a:t>
+            </a:r>
+            <a:endParaRPr lang="en-US" sz="3200" dirty="0"/>
+          </a:p>
+        </p:txBody>
+      </p:sp>
+      <p:sp>
+        <p:nvSpPr>
+          <p:cNvPr id="6" name="Text Placeholder 5"/>
+          <p:cNvSpPr>
+            <a:spLocks noGrp="1"/>
+          </p:cNvSpPr>
+          <p:nvPr>
+            <p:ph type="body" idx="1"/>
+          </p:nvPr>
+        </p:nvSpPr>
+        <p:spPr/>
+        <p:txBody>
+          <a:bodyPr/>
+          <a:lstStyle/>
+          <a:p>
+            <a:r>
+              <a:rPr lang="en-US" dirty="0" smtClean="0"/>
+              <a:t>WGBS</a:t>
+            </a:r>
+            <a:endParaRPr lang="en-US" dirty="0"/>
+          </a:p>
+        </p:txBody>
+      </p:sp>
+      <p:sp>
+        <p:nvSpPr>
+          <p:cNvPr id="7" name="Content Placeholder 6"/>
+          <p:cNvSpPr>
+            <a:spLocks noGrp="1"/>
+          </p:cNvSpPr>
+          <p:nvPr>
+            <p:ph sz="half" idx="2"/>
+          </p:nvPr>
+        </p:nvSpPr>
+        <p:spPr/>
+        <p:txBody>
+          <a:bodyPr/>
+          <a:lstStyle/>
+          <a:p>
+            <a:endParaRPr lang="en-US"/>
+          </a:p>
+        </p:txBody>
+      </p:sp>
+      <p:sp>
+        <p:nvSpPr>
+          <p:cNvPr id="8" name="Text Placeholder 7"/>
+          <p:cNvSpPr>
+            <a:spLocks noGrp="1"/>
+          </p:cNvSpPr>
+          <p:nvPr>
+            <p:ph type="body" sz="quarter" idx="3"/>
+          </p:nvPr>
+        </p:nvSpPr>
+        <p:spPr/>
+        <p:txBody>
+          <a:bodyPr/>
+          <a:lstStyle/>
+          <a:p>
+            <a:r>
+              <a:rPr lang="en-US" dirty="0" smtClean="0"/>
+              <a:t>RRBS</a:t>
+            </a:r>
+            <a:endParaRPr lang="en-US" dirty="0"/>
+          </a:p>
+        </p:txBody>
+      </p:sp>
+      <p:sp>
+        <p:nvSpPr>
+          <p:cNvPr id="9" name="Content Placeholder 8"/>
+          <p:cNvSpPr>
+            <a:spLocks noGrp="1"/>
+          </p:cNvSpPr>
+          <p:nvPr>
+            <p:ph sz="quarter" idx="4"/>
+          </p:nvPr>
+        </p:nvSpPr>
+        <p:spPr/>
+        <p:txBody>
+          <a:bodyPr/>
+          <a:lstStyle/>
+          <a:p>
+            <a:endParaRPr lang="en-US" dirty="0"/>
+          </a:p>
+        </p:txBody>
+      </p:sp>
+    </p:spTree>
+    <p:extLst>
+      <p:ext uri="{BB962C8B-B14F-4D97-AF65-F5344CB8AC3E}">
+        <p14:creationId xmlns:p14="http://schemas.microsoft.com/office/powerpoint/2010/main" val="721065945"/>
+      </p:ext>
+    </p:extLst>
+  </p:cSld>
+  <p:clrMapOvr>
+    <a:masterClrMapping/>
+  </p:clrMapOvr>
+</p:sld>
+</file>
+
+<file path=ppt/slides/slide12.xml><?xml version="1.0" encoding="utf-8"?>
+<p:sld xmlns:a="http://schemas.openxmlformats.org/drawingml/2006/main" xmlns:r="http://schemas.openxmlformats.org/officeDocument/2006/relationships" xmlns:p="http://schemas.openxmlformats.org/presentationml/2006/main">
+  <p:cSld>
+    <p:spTree>
+      <p:nvGrpSpPr>
+        <p:cNvPr id="1" name=""/>
+        <p:cNvGrpSpPr/>
+        <p:nvPr/>
+      </p:nvGrpSpPr>
+      <p:grpSpPr>
+        <a:xfrm>
+          <a:off x="0" y="0"/>
+          <a:ext cx="0" cy="0"/>
+          <a:chOff x="0" y="0"/>
+          <a:chExt cx="0" cy="0"/>
+        </a:xfrm>
+      </p:grpSpPr>
+      <p:sp>
+        <p:nvSpPr>
+          <p:cNvPr id="2" name="Title 1"/>
+          <p:cNvSpPr>
+            <a:spLocks noGrp="1"/>
+          </p:cNvSpPr>
+          <p:nvPr>
+            <p:ph type="title"/>
+          </p:nvPr>
+        </p:nvSpPr>
+        <p:spPr/>
+        <p:txBody>
+          <a:bodyPr/>
+          <a:lstStyle/>
+          <a:p>
+            <a:r>
+              <a:rPr lang="en-US" dirty="0" smtClean="0"/>
+              <a:t>Aging</a:t>
+            </a:r>
+            <a:endParaRPr lang="en-US" dirty="0"/>
+          </a:p>
+        </p:txBody>
+      </p:sp>
+      <p:sp>
+        <p:nvSpPr>
+          <p:cNvPr id="3" name="Text Placeholder 2"/>
+          <p:cNvSpPr>
+            <a:spLocks noGrp="1"/>
+          </p:cNvSpPr>
+          <p:nvPr>
+            <p:ph type="body" idx="1"/>
+          </p:nvPr>
+        </p:nvSpPr>
+        <p:spPr/>
+        <p:txBody>
+          <a:bodyPr/>
+          <a:lstStyle/>
+          <a:p>
+            <a:endParaRPr lang="en-US"/>
+          </a:p>
+        </p:txBody>
+      </p:sp>
+      <p:sp>
+        <p:nvSpPr>
+          <p:cNvPr id="4" name="Content Placeholder 3"/>
+          <p:cNvSpPr>
+            <a:spLocks noGrp="1"/>
+          </p:cNvSpPr>
+          <p:nvPr>
+            <p:ph sz="half" idx="2"/>
+          </p:nvPr>
+        </p:nvSpPr>
+        <p:spPr/>
+        <p:txBody>
+          <a:bodyPr/>
+          <a:lstStyle/>
+          <a:p>
+            <a:endParaRPr lang="en-US"/>
+          </a:p>
+        </p:txBody>
+      </p:sp>
+      <p:sp>
+        <p:nvSpPr>
+          <p:cNvPr id="5" name="Text Placeholder 4"/>
+          <p:cNvSpPr>
+            <a:spLocks noGrp="1"/>
+          </p:cNvSpPr>
+          <p:nvPr>
+            <p:ph type="body" sz="quarter" idx="3"/>
+          </p:nvPr>
+        </p:nvSpPr>
+        <p:spPr/>
+        <p:txBody>
+          <a:bodyPr/>
+          <a:lstStyle/>
+          <a:p>
+            <a:endParaRPr lang="en-US"/>
+          </a:p>
+        </p:txBody>
+      </p:sp>
+      <p:sp>
+        <p:nvSpPr>
+          <p:cNvPr id="6" name="Content Placeholder 5"/>
+          <p:cNvSpPr>
+            <a:spLocks noGrp="1"/>
+          </p:cNvSpPr>
+          <p:nvPr>
+            <p:ph sz="quarter" idx="4"/>
+          </p:nvPr>
+        </p:nvSpPr>
+        <p:spPr/>
+        <p:txBody>
+          <a:bodyPr/>
+          <a:lstStyle/>
+          <a:p>
+            <a:endParaRPr lang="en-US"/>
+          </a:p>
+        </p:txBody>
+      </p:sp>
+    </p:spTree>
+    <p:extLst>
+      <p:ext uri="{BB962C8B-B14F-4D97-AF65-F5344CB8AC3E}">
+        <p14:creationId xmlns:p14="http://schemas.microsoft.com/office/powerpoint/2010/main" val="1998530238"/>
+      </p:ext>
+    </p:extLst>
+  </p:cSld>
+  <p:clrMapOvr>
+    <a:masterClrMapping/>
+  </p:clrMapOvr>
+</p:sld>
+</file>
+
+<file path=ppt/slides/slide13.xml><?xml version="1.0" encoding="utf-8"?>
+<p:sld xmlns:a="http://schemas.openxmlformats.org/drawingml/2006/main" xmlns:r="http://schemas.openxmlformats.org/officeDocument/2006/relationships" xmlns:p="http://schemas.openxmlformats.org/presentationml/2006/main">
+  <p:cSld>
+    <p:spTree>
+      <p:nvGrpSpPr>
+        <p:cNvPr id="1" name=""/>
+        <p:cNvGrpSpPr/>
+        <p:nvPr/>
+      </p:nvGrpSpPr>
+      <p:grpSpPr>
+        <a:xfrm>
+          <a:off x="0" y="0"/>
+          <a:ext cx="0" cy="0"/>
+          <a:chOff x="0" y="0"/>
+          <a:chExt cx="0" cy="0"/>
+        </a:xfrm>
+      </p:grpSpPr>
+      <p:sp>
+        <p:nvSpPr>
+          <p:cNvPr id="2" name="Title 1"/>
+          <p:cNvSpPr>
+            <a:spLocks noGrp="1"/>
+          </p:cNvSpPr>
+          <p:nvPr>
+            <p:ph type="title"/>
+          </p:nvPr>
+        </p:nvSpPr>
+        <p:spPr/>
+        <p:txBody>
+          <a:bodyPr/>
+          <a:lstStyle/>
+          <a:p>
+            <a:r>
+              <a:rPr lang="en-US" dirty="0" err="1" smtClean="0"/>
+              <a:t>Methclone</a:t>
+            </a:r>
+            <a:endParaRPr lang="en-US" dirty="0"/>
+          </a:p>
+        </p:txBody>
+      </p:sp>
+      <p:sp>
+        <p:nvSpPr>
+          <p:cNvPr id="3" name="Text Placeholder 2"/>
+          <p:cNvSpPr>
+            <a:spLocks noGrp="1"/>
+          </p:cNvSpPr>
+          <p:nvPr>
+            <p:ph type="body" idx="1"/>
+          </p:nvPr>
+        </p:nvSpPr>
+        <p:spPr/>
+        <p:txBody>
+          <a:bodyPr/>
+          <a:lstStyle/>
+          <a:p>
+            <a:endParaRPr lang="en-US"/>
+          </a:p>
+        </p:txBody>
+      </p:sp>
+      <p:sp>
+        <p:nvSpPr>
+          <p:cNvPr id="4" name="Content Placeholder 3"/>
+          <p:cNvSpPr>
+            <a:spLocks noGrp="1"/>
+          </p:cNvSpPr>
+          <p:nvPr>
+            <p:ph sz="half" idx="2"/>
+          </p:nvPr>
+        </p:nvSpPr>
+        <p:spPr/>
+        <p:txBody>
+          <a:bodyPr/>
+          <a:lstStyle/>
+          <a:p>
+            <a:endParaRPr lang="en-US"/>
+          </a:p>
+        </p:txBody>
+      </p:sp>
+      <p:sp>
+        <p:nvSpPr>
+          <p:cNvPr id="5" name="Text Placeholder 4"/>
+          <p:cNvSpPr>
+            <a:spLocks noGrp="1"/>
+          </p:cNvSpPr>
+          <p:nvPr>
+            <p:ph type="body" sz="quarter" idx="3"/>
+          </p:nvPr>
+        </p:nvSpPr>
+        <p:spPr/>
+        <p:txBody>
+          <a:bodyPr/>
+          <a:lstStyle/>
+          <a:p>
+            <a:endParaRPr lang="en-US"/>
+          </a:p>
+        </p:txBody>
+      </p:sp>
+      <p:sp>
+        <p:nvSpPr>
+          <p:cNvPr id="6" name="Content Placeholder 5"/>
+          <p:cNvSpPr>
+            <a:spLocks noGrp="1"/>
+          </p:cNvSpPr>
+          <p:nvPr>
+            <p:ph sz="quarter" idx="4"/>
+          </p:nvPr>
+        </p:nvSpPr>
+        <p:spPr/>
+        <p:txBody>
+          <a:bodyPr/>
+          <a:lstStyle/>
+          <a:p>
+            <a:endParaRPr lang="en-US"/>
+          </a:p>
+        </p:txBody>
+      </p:sp>
+    </p:spTree>
+    <p:extLst>
+      <p:ext uri="{BB962C8B-B14F-4D97-AF65-F5344CB8AC3E}">
+        <p14:creationId xmlns:p14="http://schemas.microsoft.com/office/powerpoint/2010/main" val="1838994199"/>
+      </p:ext>
+    </p:extLst>
+  </p:cSld>
+  <p:clrMapOvr>
+    <a:masterClrMapping/>
+  </p:clrMapOvr>
+</p:sld>
+</file>
+
+<file path=ppt/slides/slide14.xml><?xml version="1.0" encoding="utf-8"?>
+<p:sld xmlns:a="http://schemas.openxmlformats.org/drawingml/2006/main" xmlns:r="http://schemas.openxmlformats.org/officeDocument/2006/relationships" xmlns:p="http://schemas.openxmlformats.org/presentationml/2006/main">
+  <p:cSld>
+    <p:spTree>
+      <p:nvGrpSpPr>
+        <p:cNvPr id="1" name=""/>
+        <p:cNvGrpSpPr/>
+        <p:nvPr/>
+      </p:nvGrpSpPr>
+      <p:grpSpPr>
+        <a:xfrm>
+          <a:off x="0" y="0"/>
+          <a:ext cx="0" cy="0"/>
+          <a:chOff x="0" y="0"/>
+          <a:chExt cx="0" cy="0"/>
+        </a:xfrm>
+      </p:grpSpPr>
+      <p:sp>
+        <p:nvSpPr>
+          <p:cNvPr id="2" name="Title 1"/>
+          <p:cNvSpPr>
+            <a:spLocks noGrp="1"/>
+          </p:cNvSpPr>
+          <p:nvPr>
+            <p:ph type="title"/>
+          </p:nvPr>
+        </p:nvSpPr>
+        <p:spPr/>
+        <p:txBody>
+          <a:bodyPr/>
+          <a:lstStyle/>
+          <a:p>
+            <a:r>
+              <a:rPr lang="en-US" dirty="0" smtClean="0"/>
+              <a:t>Epilog</a:t>
+            </a:r>
+            <a:endParaRPr lang="en-US" dirty="0"/>
+          </a:p>
+        </p:txBody>
+      </p:sp>
+      <p:sp>
+        <p:nvSpPr>
+          <p:cNvPr id="7" name="Content Placeholder 6"/>
+          <p:cNvSpPr>
+            <a:spLocks noGrp="1"/>
+          </p:cNvSpPr>
+          <p:nvPr>
+            <p:ph idx="1"/>
+          </p:nvPr>
+        </p:nvSpPr>
+        <p:spPr/>
+        <p:txBody>
+          <a:bodyPr>
+            <a:normAutofit fontScale="62500" lnSpcReduction="20000"/>
+          </a:bodyPr>
+          <a:lstStyle/>
+          <a:p>
+            <a:r>
+              <a:rPr lang="en-US" dirty="0" smtClean="0"/>
+              <a:t>Current capabilities</a:t>
+            </a:r>
+          </a:p>
+          <a:p>
+            <a:r>
+              <a:rPr lang="en-US" dirty="0" smtClean="0"/>
+              <a:t>Ideas for development</a:t>
+            </a:r>
+          </a:p>
+          <a:p>
+            <a:pPr lvl="1"/>
+            <a:r>
+              <a:rPr lang="en-US" dirty="0" err="1" smtClean="0"/>
+              <a:t>Methclone</a:t>
+            </a:r>
+            <a:r>
+              <a:rPr lang="en-US" dirty="0" smtClean="0"/>
+              <a:t>-like, but more flexible</a:t>
+            </a:r>
+          </a:p>
+          <a:p>
+            <a:pPr lvl="2"/>
+            <a:r>
+              <a:rPr lang="en-US" dirty="0" err="1" smtClean="0"/>
+              <a:t>Epipolymorphism</a:t>
+            </a:r>
+            <a:endParaRPr lang="en-US" dirty="0" smtClean="0"/>
+          </a:p>
+          <a:p>
+            <a:pPr lvl="2"/>
+            <a:r>
+              <a:rPr lang="en-US" dirty="0" smtClean="0"/>
+              <a:t>Combinatorial entropy</a:t>
+            </a:r>
+          </a:p>
+          <a:p>
+            <a:r>
+              <a:rPr lang="en-US" dirty="0" smtClean="0"/>
+              <a:t>Deterministic vs. stochastic evolution of methylation accumulation susceptibility is associated with CTCF occupancy and histone modification (connect to brief overview of histone modification.) (“Epigenetic </a:t>
+            </a:r>
+            <a:r>
+              <a:rPr lang="en-US" dirty="0" err="1" smtClean="0"/>
+              <a:t>polymporphism</a:t>
+            </a:r>
+            <a:r>
+              <a:rPr lang="en-US" dirty="0" smtClean="0"/>
+              <a:t> and stochastic formation</a:t>
+            </a:r>
+            <a:r>
+              <a:rPr lang="is-IS" dirty="0" smtClean="0"/>
+              <a:t>….”</a:t>
+            </a:r>
+            <a:r>
+              <a:rPr lang="en-US" dirty="0" smtClean="0"/>
+              <a:t>)</a:t>
+            </a:r>
+          </a:p>
+          <a:p>
+            <a:r>
+              <a:rPr lang="en-US" dirty="0" smtClean="0"/>
+              <a:t>ESCs and </a:t>
+            </a:r>
+            <a:r>
+              <a:rPr lang="en-US" dirty="0" err="1" smtClean="0"/>
+              <a:t>germline</a:t>
+            </a:r>
+            <a:r>
+              <a:rPr lang="en-US" dirty="0" smtClean="0"/>
+              <a:t> cells able to establish stable methylation program rather than random changes seen in somatic cells (“Epigenetic </a:t>
+            </a:r>
+            <a:r>
+              <a:rPr lang="en-US" dirty="0" err="1" smtClean="0"/>
+              <a:t>polymporphism</a:t>
+            </a:r>
+            <a:r>
+              <a:rPr lang="is-IS" dirty="0" smtClean="0"/>
+              <a:t>…</a:t>
+            </a:r>
+            <a:r>
+              <a:rPr lang="en-US" dirty="0" smtClean="0"/>
+              <a:t>”)</a:t>
+            </a:r>
+            <a:endParaRPr lang="en-US" dirty="0"/>
+          </a:p>
+          <a:p>
+            <a:r>
+              <a:rPr lang="en-US" dirty="0" smtClean="0"/>
+              <a:t>Applications</a:t>
+            </a:r>
+          </a:p>
+          <a:p>
+            <a:pPr lvl="1"/>
+            <a:r>
+              <a:rPr lang="en-US" dirty="0" err="1" smtClean="0"/>
+              <a:t>Epiallelic</a:t>
+            </a:r>
+            <a:r>
+              <a:rPr lang="en-US" dirty="0" smtClean="0"/>
+              <a:t> composition across time scales in brain regions/cell types/times/conditions</a:t>
+            </a:r>
+            <a:endParaRPr lang="en-US" dirty="0"/>
+          </a:p>
+        </p:txBody>
+      </p:sp>
+    </p:spTree>
+    <p:extLst>
+      <p:ext uri="{BB962C8B-B14F-4D97-AF65-F5344CB8AC3E}">
+        <p14:creationId xmlns:p14="http://schemas.microsoft.com/office/powerpoint/2010/main" val="2796789836"/>
+      </p:ext>
+    </p:extLst>
+  </p:cSld>
+  <p:clrMapOvr>
+    <a:masterClrMapping/>
+  </p:clrMapOvr>
+</p:sld>
+</file>
+
 <file path=ppt/slides/slide2.xml><?xml version="1.0" encoding="utf-8"?>
 <p:sld xmlns:a="http://schemas.openxmlformats.org/drawingml/2006/main" xmlns:r="http://schemas.openxmlformats.org/officeDocument/2006/relationships" xmlns:p="http://schemas.openxmlformats.org/presentationml/2006/main">
   <p:cSld>
@@ -3787,24 +4471,44 @@
             <a:spLocks noGrp="1"/>
           </p:cNvSpPr>
           <p:nvPr>
-            <p:ph idx="1"/>
-          </p:nvPr>
-        </p:nvSpPr>
-        <p:spPr/>
+            <p:ph idx="4294967295"/>
+          </p:nvPr>
+        </p:nvSpPr>
+        <p:spPr>
+          <a:xfrm>
+            <a:off x="0" y="1600200"/>
+            <a:ext cx="4178849" cy="4343400"/>
+          </a:xfrm>
+        </p:spPr>
         <p:txBody>
           <a:bodyPr/>
           <a:lstStyle/>
           <a:p>
             <a:r>
               <a:rPr lang="en-US" dirty="0" smtClean="0"/>
-              <a:t>Manual labor</a:t>
-            </a:r>
+              <a:t>Starts small, manual</a:t>
+            </a:r>
+          </a:p>
+          <a:p>
+            <a:endParaRPr lang="en-US" dirty="0"/>
+          </a:p>
+          <a:p>
+            <a:endParaRPr lang="en-US" dirty="0" smtClean="0"/>
           </a:p>
           <a:p>
             <a:r>
               <a:rPr lang="en-US" dirty="0" smtClean="0"/>
-              <a:t>Chaotic confederacy</a:t>
-            </a:r>
+              <a:t>More tools, more chaos </a:t>
+            </a:r>
+          </a:p>
+          <a:p>
+            <a:pPr marL="0" indent="0">
+              <a:buNone/>
+            </a:pPr>
+            <a:endParaRPr lang="en-US" dirty="0" smtClean="0"/>
+          </a:p>
+          <a:p>
+            <a:endParaRPr lang="en-US" dirty="0" smtClean="0"/>
           </a:p>
           <a:p>
             <a:r>
@@ -3817,6 +4521,96 @@
           </a:p>
         </p:txBody>
       </p:sp>
+      <p:pic>
+        <p:nvPicPr>
+          <p:cNvPr id="4" name="Picture 3" descr="harvesters_manual.jpg"/>
+          <p:cNvPicPr>
+            <a:picLocks noChangeAspect="1"/>
+          </p:cNvPicPr>
+          <p:nvPr/>
+        </p:nvPicPr>
+        <p:blipFill>
+          <a:blip r:embed="rId2">
+            <a:extLst>
+              <a:ext uri="{28A0092B-C50C-407E-A947-70E740481C1C}">
+                <a14:useLocalDpi xmlns:a14="http://schemas.microsoft.com/office/drawing/2010/main" val="0"/>
+              </a:ext>
+            </a:extLst>
+          </a:blip>
+          <a:stretch>
+            <a:fillRect/>
+          </a:stretch>
+        </p:blipFill>
+        <p:spPr>
+          <a:xfrm>
+            <a:off x="4272635" y="1600201"/>
+            <a:ext cx="1486201" cy="1476592"/>
+          </a:xfrm>
+          <a:prstGeom prst="rect">
+            <a:avLst/>
+          </a:prstGeom>
+        </p:spPr>
+      </p:pic>
+      <p:pic>
+        <p:nvPicPr>
+          <p:cNvPr id="5" name="Picture 4" descr="manual_bruegel_2.JPG"/>
+          <p:cNvPicPr>
+            <a:picLocks noChangeAspect="1"/>
+          </p:cNvPicPr>
+          <p:nvPr/>
+        </p:nvPicPr>
+        <p:blipFill>
+          <a:blip r:embed="rId3">
+            <a:extLst>
+              <a:ext uri="{28A0092B-C50C-407E-A947-70E740481C1C}">
+                <a14:useLocalDpi xmlns:a14="http://schemas.microsoft.com/office/drawing/2010/main" val="0"/>
+              </a:ext>
+            </a:extLst>
+          </a:blip>
+          <a:stretch>
+            <a:fillRect/>
+          </a:stretch>
+        </p:blipFill>
+        <p:spPr>
+          <a:xfrm>
+            <a:off x="5317926" y="3423919"/>
+            <a:ext cx="1676324" cy="1301917"/>
+          </a:xfrm>
+          <a:prstGeom prst="rect">
+            <a:avLst/>
+          </a:prstGeom>
+        </p:spPr>
+      </p:pic>
+      <p:pic>
+        <p:nvPicPr>
+          <p:cNvPr id="6" name="Picture 5" descr="frustration.jpg"/>
+          <p:cNvPicPr>
+            <a:picLocks noChangeAspect="1"/>
+          </p:cNvPicPr>
+          <p:nvPr/>
+        </p:nvPicPr>
+        <p:blipFill>
+          <a:blip r:embed="rId4">
+            <a:extLst>
+              <a:ext uri="{28A0092B-C50C-407E-A947-70E740481C1C}">
+                <a14:useLocalDpi xmlns:a14="http://schemas.microsoft.com/office/drawing/2010/main" val="0"/>
+              </a:ext>
+            </a:extLst>
+          </a:blip>
+          <a:stretch>
+            <a:fillRect/>
+          </a:stretch>
+        </p:blipFill>
+        <p:spPr>
+          <a:xfrm>
+            <a:off x="7219455" y="4725836"/>
+            <a:ext cx="1372096" cy="1792494"/>
+          </a:xfrm>
+          <a:prstGeom prst="rect">
+            <a:avLst/>
+          </a:prstGeom>
+        </p:spPr>
+      </p:pic>
     </p:spTree>
     <p:extLst>
       <p:ext uri="{BB962C8B-B14F-4D97-AF65-F5344CB8AC3E}">
@@ -3857,7 +4651,12 @@
             <p:ph type="title"/>
           </p:nvPr>
         </p:nvSpPr>
-        <p:spPr/>
+        <p:spPr>
+          <a:xfrm>
+            <a:off x="549275" y="-10570"/>
+            <a:ext cx="8042276" cy="1336956"/>
+          </a:xfrm>
+        </p:spPr>
         <p:txBody>
           <a:bodyPr/>
           <a:lstStyle/>
@@ -3884,10 +4683,15 @@
             <p:ph idx="1"/>
           </p:nvPr>
         </p:nvSpPr>
-        <p:spPr/>
+        <p:spPr>
+          <a:xfrm>
+            <a:off x="549275" y="1600201"/>
+            <a:ext cx="4899471" cy="4343400"/>
+          </a:xfrm>
+        </p:spPr>
         <p:txBody>
           <a:bodyPr>
-            <a:normAutofit fontScale="92500" lnSpcReduction="10000"/>
+            <a:normAutofit fontScale="85000" lnSpcReduction="20000"/>
           </a:bodyPr>
           <a:lstStyle/>
           <a:p>
@@ -3900,15 +4704,22 @@
             <a:pPr lvl="1"/>
             <a:r>
               <a:rPr lang="en-US" dirty="0" smtClean="0"/>
-              <a:t>Environment variables (</a:t>
-            </a:r>
+              <a:t>Environment variables</a:t>
+            </a:r>
+          </a:p>
+          <a:p>
+            <a:pPr lvl="2"/>
             <a:r>
               <a:rPr lang="en-US" dirty="0" err="1" smtClean="0"/>
               <a:t>CeMM</a:t>
             </a:r>
+            <a:endParaRPr lang="en-US" dirty="0" smtClean="0"/>
+          </a:p>
+          <a:p>
+            <a:pPr lvl="2"/>
             <a:r>
               <a:rPr lang="en-US" dirty="0" smtClean="0"/>
-              <a:t>, UVA)</a:t>
+              <a:t>UVA</a:t>
             </a:r>
           </a:p>
           <a:p>
@@ -3934,6 +4745,30 @@
           </a:p>
           <a:p>
             <a:r>
+              <a:rPr lang="en-US" dirty="0"/>
+              <a:t>Monitoring/logging</a:t>
+            </a:r>
+          </a:p>
+          <a:p>
+            <a:pPr lvl="1"/>
+            <a:r>
+              <a:rPr lang="en-US" dirty="0"/>
+              <a:t>Automatically in output directories</a:t>
+            </a:r>
+          </a:p>
+          <a:p>
+            <a:pPr lvl="1"/>
+            <a:r>
+              <a:rPr lang="en-US" dirty="0"/>
+              <a:t>Could put on web/</a:t>
+            </a:r>
+            <a:r>
+              <a:rPr lang="en-US" dirty="0" smtClean="0"/>
+              <a:t>email</a:t>
+            </a:r>
+          </a:p>
+          <a:p>
+            <a:r>
               <a:rPr lang="en-US" dirty="0" err="1" smtClean="0"/>
               <a:t>Restartable</a:t>
             </a:r>
@@ -3957,28 +4792,98 @@
               <a:t>Don’t duplicate work</a:t>
             </a:r>
           </a:p>
-          <a:p>
-            <a:r>
-              <a:rPr lang="en-US" dirty="0" smtClean="0"/>
-              <a:t>Monitoring/logging</a:t>
-            </a:r>
-          </a:p>
-          <a:p>
-            <a:pPr lvl="1"/>
-            <a:r>
-              <a:rPr lang="en-US" dirty="0" smtClean="0"/>
-              <a:t>Automatically created in output directories</a:t>
-            </a:r>
-          </a:p>
-          <a:p>
-            <a:pPr lvl="1"/>
-            <a:r>
-              <a:rPr lang="en-US" dirty="0" smtClean="0"/>
-              <a:t>Could put on web/email</a:t>
-            </a:r>
-          </a:p>
-        </p:txBody>
-      </p:sp>
+        </p:txBody>
+      </p:sp>
+      <p:pic>
+        <p:nvPicPr>
+          <p:cNvPr id="4" name="Picture 3" descr="moving_icon.jpg"/>
+          <p:cNvPicPr>
+            <a:picLocks noChangeAspect="1"/>
+          </p:cNvPicPr>
+          <p:nvPr/>
+        </p:nvPicPr>
+        <p:blipFill>
+          <a:blip r:embed="rId2">
+            <a:extLst>
+              <a:ext uri="{28A0092B-C50C-407E-A947-70E740481C1C}">
+                <a14:useLocalDpi xmlns:a14="http://schemas.microsoft.com/office/drawing/2010/main" val="0"/>
+              </a:ext>
+            </a:extLst>
+          </a:blip>
+          <a:stretch>
+            <a:fillRect/>
+          </a:stretch>
+        </p:blipFill>
+        <p:spPr>
+          <a:xfrm>
+            <a:off x="6647571" y="1792189"/>
+            <a:ext cx="1220532" cy="1220532"/>
+          </a:xfrm>
+          <a:prstGeom prst="rect">
+            <a:avLst/>
+          </a:prstGeom>
+        </p:spPr>
+      </p:pic>
+      <p:pic>
+        <p:nvPicPr>
+          <p:cNvPr id="5" name="Picture 4" descr="monitoring.png"/>
+          <p:cNvPicPr>
+            <a:picLocks noChangeAspect="1"/>
+          </p:cNvPicPr>
+          <p:nvPr/>
+        </p:nvPicPr>
+        <p:blipFill>
+          <a:blip r:embed="rId3">
+            <a:extLst>
+              <a:ext uri="{28A0092B-C50C-407E-A947-70E740481C1C}">
+                <a14:useLocalDpi xmlns:a14="http://schemas.microsoft.com/office/drawing/2010/main" val="0"/>
+              </a:ext>
+            </a:extLst>
+          </a:blip>
+          <a:stretch>
+            <a:fillRect/>
+          </a:stretch>
+        </p:blipFill>
+        <p:spPr>
+          <a:xfrm>
+            <a:off x="6644812" y="3322853"/>
+            <a:ext cx="1291900" cy="1291900"/>
+          </a:xfrm>
+          <a:prstGeom prst="rect">
+            <a:avLst/>
+          </a:prstGeom>
+        </p:spPr>
+      </p:pic>
+      <p:pic>
+        <p:nvPicPr>
+          <p:cNvPr id="6" name="Picture 5" descr="restart.png"/>
+          <p:cNvPicPr>
+            <a:picLocks noChangeAspect="1"/>
+          </p:cNvPicPr>
+          <p:nvPr/>
+        </p:nvPicPr>
+        <p:blipFill>
+          <a:blip r:embed="rId4">
+            <a:extLst>
+              <a:ext uri="{28A0092B-C50C-407E-A947-70E740481C1C}">
+                <a14:useLocalDpi xmlns:a14="http://schemas.microsoft.com/office/drawing/2010/main" val="0"/>
+              </a:ext>
+            </a:extLst>
+          </a:blip>
+          <a:stretch>
+            <a:fillRect/>
+          </a:stretch>
+        </p:blipFill>
+        <p:spPr>
+          <a:xfrm>
+            <a:off x="6838168" y="4913666"/>
+            <a:ext cx="1029935" cy="1029935"/>
+          </a:xfrm>
+          <a:prstGeom prst="rect">
+            <a:avLst/>
+          </a:prstGeom>
+        </p:spPr>
+      </p:pic>
     </p:spTree>
     <p:extLst>
       <p:ext uri="{BB962C8B-B14F-4D97-AF65-F5344CB8AC3E}">
@@ -4019,14 +4924,27 @@
             <p:ph type="title"/>
           </p:nvPr>
         </p:nvSpPr>
-        <p:spPr/>
+        <p:spPr>
+          <a:xfrm>
+            <a:off x="206726" y="107576"/>
+            <a:ext cx="8653023" cy="1336956"/>
+          </a:xfrm>
+        </p:spPr>
         <p:txBody>
           <a:bodyPr/>
           <a:lstStyle/>
           <a:p>
             <a:r>
               <a:rPr lang="en-US" dirty="0" smtClean="0"/>
-              <a:t>Epigenetics, broadly</a:t>
+              <a:t>Configuration + </a:t>
+            </a:r>
+            <a:r>
+              <a:rPr lang="en-US" dirty="0"/>
+              <a:t>s</a:t>
+            </a:r>
+            <a:r>
+              <a:rPr lang="en-US" dirty="0" smtClean="0"/>
+              <a:t>ample sheet</a:t>
             </a:r>
             <a:endParaRPr lang="en-US" dirty="0"/>
           </a:p>
@@ -4047,84 +4965,14 @@
           <a:bodyPr/>
           <a:lstStyle/>
           <a:p>
-            <a:r>
-              <a:rPr lang="en-US" dirty="0" smtClean="0"/>
-              <a:t>Expanding extent of influence</a:t>
-            </a:r>
-          </a:p>
-          <a:p>
-            <a:pPr lvl="1"/>
-            <a:r>
-              <a:rPr lang="en-US" dirty="0" smtClean="0"/>
-              <a:t>Disease</a:t>
-            </a:r>
-          </a:p>
-          <a:p>
-            <a:pPr lvl="1"/>
-            <a:r>
-              <a:rPr lang="en-US" dirty="0" smtClean="0"/>
-              <a:t>Development/differentiation</a:t>
-            </a:r>
-          </a:p>
-          <a:p>
-            <a:r>
-              <a:rPr lang="en-US" dirty="0" smtClean="0"/>
-              <a:t>Few primary forms</a:t>
-            </a:r>
-          </a:p>
-          <a:p>
-            <a:pPr lvl="1"/>
-            <a:r>
-              <a:rPr lang="en-US" dirty="0" smtClean="0"/>
-              <a:t>DNA methylation</a:t>
-            </a:r>
-          </a:p>
-          <a:p>
-            <a:pPr lvl="1"/>
-            <a:r>
-              <a:rPr lang="en-US" dirty="0" smtClean="0"/>
-              <a:t>Histone modifications</a:t>
-            </a:r>
-          </a:p>
-          <a:p>
-            <a:pPr lvl="2"/>
-            <a:r>
-              <a:rPr lang="en-US" dirty="0" smtClean="0"/>
-              <a:t>Methylation</a:t>
-            </a:r>
-          </a:p>
-          <a:p>
-            <a:pPr lvl="2"/>
-            <a:r>
-              <a:rPr lang="en-US" dirty="0" smtClean="0"/>
-              <a:t>Acetylation</a:t>
-            </a:r>
-          </a:p>
-          <a:p>
-            <a:pPr lvl="2"/>
-            <a:r>
-              <a:rPr lang="en-US" dirty="0" err="1" smtClean="0"/>
-              <a:t>Ubiquitination</a:t>
-            </a:r>
-            <a:endParaRPr lang="en-US" dirty="0"/>
-          </a:p>
-          <a:p>
-            <a:pPr lvl="1"/>
-            <a:r>
-              <a:rPr lang="en-US" dirty="0" smtClean="0"/>
-              <a:t>Histone protein variants</a:t>
-            </a:r>
-          </a:p>
-          <a:p>
-            <a:pPr lvl="1"/>
-            <a:endParaRPr lang="en-US" dirty="0"/>
+            <a:endParaRPr lang="en-US"/>
           </a:p>
         </p:txBody>
       </p:sp>
     </p:spTree>
     <p:extLst>
       <p:ext uri="{BB962C8B-B14F-4D97-AF65-F5344CB8AC3E}">
-        <p14:creationId xmlns:p14="http://schemas.microsoft.com/office/powerpoint/2010/main" val="1928671970"/>
+        <p14:creationId xmlns:p14="http://schemas.microsoft.com/office/powerpoint/2010/main" val="3354691786"/>
       </p:ext>
     </p:extLst>
   </p:cSld>
@@ -4168,7 +5016,7 @@
           <a:p>
             <a:r>
               <a:rPr lang="en-US" dirty="0" smtClean="0"/>
-              <a:t>Brain feminization in rats</a:t>
+              <a:t>Epigenetics, broadly</a:t>
             </a:r>
             <a:endParaRPr lang="en-US" dirty="0"/>
           </a:p>
@@ -4181,22 +5029,193 @@
             <a:spLocks noGrp="1"/>
           </p:cNvSpPr>
           <p:nvPr>
-            <p:ph idx="1"/>
-          </p:nvPr>
-        </p:nvSpPr>
-        <p:spPr/>
-        <p:txBody>
-          <a:bodyPr/>
-          <a:lstStyle/>
-          <a:p>
-            <a:endParaRPr lang="en-US"/>
-          </a:p>
-        </p:txBody>
-      </p:sp>
+            <p:ph sz="half" idx="1"/>
+          </p:nvPr>
+        </p:nvSpPr>
+        <p:spPr>
+          <a:xfrm>
+            <a:off x="205471" y="1444533"/>
+            <a:ext cx="3840480" cy="2388356"/>
+          </a:xfrm>
+        </p:spPr>
+        <p:txBody>
+          <a:bodyPr>
+            <a:normAutofit/>
+          </a:bodyPr>
+          <a:lstStyle/>
+          <a:p>
+            <a:r>
+              <a:rPr lang="en-US" dirty="0" smtClean="0"/>
+              <a:t>Growing extent of understood influence</a:t>
+            </a:r>
+          </a:p>
+          <a:p>
+            <a:pPr lvl="1"/>
+            <a:r>
+              <a:rPr lang="en-US" dirty="0" smtClean="0"/>
+              <a:t>Development and </a:t>
+            </a:r>
+          </a:p>
+          <a:p>
+            <a:pPr lvl="1"/>
+            <a:r>
+              <a:rPr lang="en-US" dirty="0" smtClean="0"/>
+              <a:t>Disease</a:t>
+            </a:r>
+          </a:p>
+          <a:p>
+            <a:pPr lvl="1"/>
+            <a:r>
+              <a:rPr lang="en-US" dirty="0" smtClean="0"/>
+              <a:t>Development/differentiation</a:t>
+            </a:r>
+          </a:p>
+          <a:p>
+            <a:pPr lvl="1"/>
+            <a:endParaRPr lang="en-US" dirty="0"/>
+          </a:p>
+        </p:txBody>
+      </p:sp>
+      <p:sp>
+        <p:nvSpPr>
+          <p:cNvPr id="4" name="Content Placeholder 3"/>
+          <p:cNvSpPr>
+            <a:spLocks noGrp="1"/>
+          </p:cNvSpPr>
+          <p:nvPr>
+            <p:ph sz="half" idx="2"/>
+          </p:nvPr>
+        </p:nvSpPr>
+        <p:spPr>
+          <a:xfrm>
+            <a:off x="4751071" y="3440999"/>
+            <a:ext cx="3840480" cy="2605979"/>
+          </a:xfrm>
+        </p:spPr>
+        <p:txBody>
+          <a:bodyPr>
+            <a:normAutofit/>
+          </a:bodyPr>
+          <a:lstStyle/>
+          <a:p>
+            <a:r>
+              <a:rPr lang="en-US" dirty="0" smtClean="0"/>
+              <a:t>Several main forms</a:t>
+            </a:r>
+            <a:endParaRPr lang="en-US" dirty="0"/>
+          </a:p>
+          <a:p>
+            <a:pPr lvl="1"/>
+            <a:r>
+              <a:rPr lang="en-US" dirty="0"/>
+              <a:t>DNA methylation</a:t>
+            </a:r>
+          </a:p>
+          <a:p>
+            <a:pPr lvl="1"/>
+            <a:r>
+              <a:rPr lang="en-US" dirty="0"/>
+              <a:t>Histone modifications</a:t>
+            </a:r>
+          </a:p>
+          <a:p>
+            <a:pPr lvl="2"/>
+            <a:r>
+              <a:rPr lang="en-US" dirty="0"/>
+              <a:t>Methylation</a:t>
+            </a:r>
+          </a:p>
+          <a:p>
+            <a:pPr lvl="2"/>
+            <a:r>
+              <a:rPr lang="en-US" dirty="0"/>
+              <a:t>Acetylation</a:t>
+            </a:r>
+          </a:p>
+          <a:p>
+            <a:pPr lvl="2"/>
+            <a:r>
+              <a:rPr lang="en-US" dirty="0" err="1"/>
+              <a:t>Ubiquitination</a:t>
+            </a:r>
+            <a:endParaRPr lang="en-US" dirty="0"/>
+          </a:p>
+          <a:p>
+            <a:pPr lvl="1"/>
+            <a:r>
+              <a:rPr lang="en-US" dirty="0"/>
+              <a:t>Histone protein variants</a:t>
+            </a:r>
+          </a:p>
+          <a:p>
+            <a:endParaRPr lang="en-US" dirty="0"/>
+          </a:p>
+        </p:txBody>
+      </p:sp>
+      <p:pic>
+        <p:nvPicPr>
+          <p:cNvPr id="6" name="Picture 5" descr="epigenetics_MSKCC.jpg"/>
+          <p:cNvPicPr>
+            <a:picLocks noChangeAspect="1"/>
+          </p:cNvPicPr>
+          <p:nvPr/>
+        </p:nvPicPr>
+        <p:blipFill>
+          <a:blip r:embed="rId2">
+            <a:extLst>
+              <a:ext uri="{28A0092B-C50C-407E-A947-70E740481C1C}">
+                <a14:useLocalDpi xmlns:a14="http://schemas.microsoft.com/office/drawing/2010/main" val="0"/>
+              </a:ext>
+            </a:extLst>
+          </a:blip>
+          <a:stretch>
+            <a:fillRect/>
+          </a:stretch>
+        </p:blipFill>
+        <p:spPr>
+          <a:xfrm>
+            <a:off x="5275988" y="1550664"/>
+            <a:ext cx="2435929" cy="1622938"/>
+          </a:xfrm>
+          <a:prstGeom prst="rect">
+            <a:avLst/>
+          </a:prstGeom>
+        </p:spPr>
+      </p:pic>
+      <p:pic>
+        <p:nvPicPr>
+          <p:cNvPr id="7" name="Picture 6" descr="epigenetic_markers_varied.jpg"/>
+          <p:cNvPicPr>
+            <a:picLocks noChangeAspect="1"/>
+          </p:cNvPicPr>
+          <p:nvPr/>
+        </p:nvPicPr>
+        <p:blipFill>
+          <a:blip r:embed="rId3">
+            <a:extLst>
+              <a:ext uri="{28A0092B-C50C-407E-A947-70E740481C1C}">
+                <a14:useLocalDpi xmlns:a14="http://schemas.microsoft.com/office/drawing/2010/main" val="0"/>
+              </a:ext>
+            </a:extLst>
+          </a:blip>
+          <a:stretch>
+            <a:fillRect/>
+          </a:stretch>
+        </p:blipFill>
+        <p:spPr>
+          <a:xfrm>
+            <a:off x="384789" y="3832889"/>
+            <a:ext cx="4366282" cy="1960857"/>
+          </a:xfrm>
+          <a:prstGeom prst="rect">
+            <a:avLst/>
+          </a:prstGeom>
+        </p:spPr>
+      </p:pic>
     </p:spTree>
     <p:extLst>
       <p:ext uri="{BB962C8B-B14F-4D97-AF65-F5344CB8AC3E}">
-        <p14:creationId xmlns:p14="http://schemas.microsoft.com/office/powerpoint/2010/main" val="2826141436"/>
+        <p14:creationId xmlns:p14="http://schemas.microsoft.com/office/powerpoint/2010/main" val="1928671970"/>
       </p:ext>
     </p:extLst>
   </p:cSld>
@@ -4233,47 +5252,137 @@
             <p:ph type="title"/>
           </p:nvPr>
         </p:nvSpPr>
+        <p:spPr/>
+        <p:txBody>
+          <a:bodyPr/>
+          <a:lstStyle/>
+          <a:p>
+            <a:r>
+              <a:rPr lang="en-US" sz="4400" dirty="0" smtClean="0"/>
+              <a:t>DNA Methylation, specifically</a:t>
+            </a:r>
+            <a:endParaRPr lang="en-US" sz="4400" dirty="0"/>
+          </a:p>
+        </p:txBody>
+      </p:sp>
+      <p:sp>
+        <p:nvSpPr>
+          <p:cNvPr id="5" name="Content Placeholder 4"/>
+          <p:cNvSpPr>
+            <a:spLocks noGrp="1"/>
+          </p:cNvSpPr>
+          <p:nvPr>
+            <p:ph idx="1"/>
+          </p:nvPr>
+        </p:nvSpPr>
         <p:spPr>
           <a:xfrm>
-            <a:off x="549275" y="107576"/>
-            <a:ext cx="8042276" cy="1336956"/>
+            <a:off x="416379" y="1600201"/>
+            <a:ext cx="4412185" cy="4343400"/>
           </a:xfrm>
         </p:spPr>
         <p:txBody>
-          <a:bodyPr/>
-          <a:lstStyle/>
-          <a:p>
-            <a:r>
-              <a:rPr lang="en-US" sz="3400" dirty="0" smtClean="0"/>
-              <a:t>Effect of PCBs on autism candidate genes via epigenetic marks</a:t>
-            </a:r>
-            <a:endParaRPr lang="en-US" sz="3400" dirty="0"/>
-          </a:p>
-        </p:txBody>
-      </p:sp>
-      <p:sp>
-        <p:nvSpPr>
-          <p:cNvPr id="3" name="Content Placeholder 2"/>
-          <p:cNvSpPr>
-            <a:spLocks noGrp="1"/>
-          </p:cNvSpPr>
-          <p:nvPr>
-            <p:ph idx="1"/>
-          </p:nvPr>
-        </p:nvSpPr>
-        <p:spPr/>
-        <p:txBody>
-          <a:bodyPr/>
-          <a:lstStyle/>
-          <a:p>
-            <a:endParaRPr lang="en-US"/>
-          </a:p>
-        </p:txBody>
-      </p:sp>
+          <a:bodyPr>
+            <a:normAutofit fontScale="92500" lnSpcReduction="10000"/>
+          </a:bodyPr>
+          <a:lstStyle/>
+          <a:p>
+            <a:r>
+              <a:rPr lang="en-US" dirty="0"/>
+              <a:t>Much of mature genome is methylated</a:t>
+            </a:r>
+          </a:p>
+          <a:p>
+            <a:pPr lvl="1"/>
+            <a:r>
+              <a:rPr lang="en-US" dirty="0"/>
+              <a:t>Interest in epigenetic landscape during development</a:t>
+            </a:r>
+          </a:p>
+          <a:p>
+            <a:pPr lvl="1"/>
+            <a:r>
+              <a:rPr lang="en-US" dirty="0"/>
+              <a:t>Methylation changes are maintained/stable (DNMT)</a:t>
+            </a:r>
+          </a:p>
+          <a:p>
+            <a:pPr lvl="2"/>
+            <a:r>
+              <a:rPr lang="en-US" dirty="0"/>
+              <a:t>De </a:t>
+            </a:r>
+            <a:r>
+              <a:rPr lang="en-US" dirty="0" smtClean="0"/>
+              <a:t>novo: DNMT3A/B</a:t>
+            </a:r>
+          </a:p>
+          <a:p>
+            <a:pPr lvl="2"/>
+            <a:r>
+              <a:rPr lang="en-US" dirty="0" smtClean="0"/>
+              <a:t>Maintenance: DNMT1</a:t>
+            </a:r>
+            <a:endParaRPr lang="en-US" dirty="0"/>
+          </a:p>
+          <a:p>
+            <a:pPr lvl="2"/>
+            <a:r>
+              <a:rPr lang="en-US" dirty="0" smtClean="0"/>
+              <a:t>Heritable</a:t>
+            </a:r>
+          </a:p>
+          <a:p>
+            <a:pPr lvl="1"/>
+            <a:r>
+              <a:rPr lang="en-US" dirty="0" smtClean="0"/>
+              <a:t>Reversibility: TET family</a:t>
+            </a:r>
+          </a:p>
+          <a:p>
+            <a:pPr lvl="2"/>
+            <a:r>
+              <a:rPr lang="en-US" dirty="0" smtClean="0"/>
+              <a:t>Research to be done into 5mC derivatives</a:t>
+            </a:r>
+            <a:endParaRPr lang="en-US" dirty="0"/>
+          </a:p>
+        </p:txBody>
+      </p:sp>
+      <p:pic>
+        <p:nvPicPr>
+          <p:cNvPr id="8" name="Picture 7" descr="methylation_processes.jpg"/>
+          <p:cNvPicPr>
+            <a:picLocks noChangeAspect="1"/>
+          </p:cNvPicPr>
+          <p:nvPr/>
+        </p:nvPicPr>
+        <p:blipFill>
+          <a:blip r:embed="rId2">
+            <a:extLst>
+              <a:ext uri="{28A0092B-C50C-407E-A947-70E740481C1C}">
+                <a14:useLocalDpi xmlns:a14="http://schemas.microsoft.com/office/drawing/2010/main" val="0"/>
+              </a:ext>
+            </a:extLst>
+          </a:blip>
+          <a:stretch>
+            <a:fillRect/>
+          </a:stretch>
+        </p:blipFill>
+        <p:spPr>
+          <a:xfrm>
+            <a:off x="4637983" y="1742651"/>
+            <a:ext cx="3953568" cy="4200950"/>
+          </a:xfrm>
+          <a:prstGeom prst="rect">
+            <a:avLst/>
+          </a:prstGeom>
+        </p:spPr>
+      </p:pic>
     </p:spTree>
     <p:extLst>
       <p:ext uri="{BB962C8B-B14F-4D97-AF65-F5344CB8AC3E}">
-        <p14:creationId xmlns:p14="http://schemas.microsoft.com/office/powerpoint/2010/main" val="2731857222"/>
+        <p14:creationId xmlns:p14="http://schemas.microsoft.com/office/powerpoint/2010/main" val="2830265040"/>
       </p:ext>
     </p:extLst>
   </p:cSld>
@@ -4310,42 +5419,155 @@
             <p:ph type="title"/>
           </p:nvPr>
         </p:nvSpPr>
-        <p:spPr/>
-        <p:txBody>
-          <a:bodyPr/>
-          <a:lstStyle/>
-          <a:p>
+        <p:spPr>
+          <a:xfrm>
+            <a:off x="221494" y="147681"/>
+            <a:ext cx="8726853" cy="1104863"/>
+          </a:xfrm>
+        </p:spPr>
+        <p:txBody>
+          <a:bodyPr/>
+          <a:lstStyle/>
+          <a:p>
+            <a:r>
+              <a:rPr lang="en-US" sz="4000" dirty="0" smtClean="0"/>
+              <a:t>Methylation and rat brain gender</a:t>
+            </a:r>
+            <a:endParaRPr lang="en-US" sz="4000" dirty="0"/>
+          </a:p>
+        </p:txBody>
+      </p:sp>
+      <p:sp>
+        <p:nvSpPr>
+          <p:cNvPr id="3" name="Content Placeholder 2"/>
+          <p:cNvSpPr>
+            <a:spLocks noGrp="1"/>
+          </p:cNvSpPr>
+          <p:nvPr>
+            <p:ph idx="1"/>
+          </p:nvPr>
+        </p:nvSpPr>
+        <p:spPr>
+          <a:xfrm>
+            <a:off x="549275" y="1600201"/>
+            <a:ext cx="3540976" cy="4343400"/>
+          </a:xfrm>
+        </p:spPr>
+        <p:txBody>
+          <a:bodyPr/>
+          <a:lstStyle/>
+          <a:p>
+            <a:r>
+              <a:rPr lang="en-US" dirty="0" err="1" smtClean="0"/>
+              <a:t>Jks</a:t>
+            </a:r>
             <a:r>
               <a:rPr lang="en-US" dirty="0" smtClean="0"/>
-              <a:t>Bisulfite Sequencing</a:t>
+              <a:t> </a:t>
+            </a:r>
+            <a:r>
+              <a:rPr lang="en-US" dirty="0" err="1" smtClean="0"/>
+              <a:t>vd</a:t>
             </a:r>
             <a:endParaRPr lang="en-US" dirty="0"/>
           </a:p>
         </p:txBody>
       </p:sp>
-      <p:sp>
-        <p:nvSpPr>
-          <p:cNvPr id="3" name="Content Placeholder 2"/>
-          <p:cNvSpPr>
-            <a:spLocks noGrp="1"/>
-          </p:cNvSpPr>
-          <p:nvPr>
-            <p:ph idx="1"/>
-          </p:nvPr>
-        </p:nvSpPr>
-        <p:spPr/>
-        <p:txBody>
-          <a:bodyPr/>
-          <a:lstStyle/>
-          <a:p>
-            <a:endParaRPr lang="en-US"/>
-          </a:p>
-        </p:txBody>
-      </p:sp>
+      <p:pic>
+        <p:nvPicPr>
+          <p:cNvPr id="5" name="Picture 4" descr="rat.gif"/>
+          <p:cNvPicPr>
+            <a:picLocks noChangeAspect="1"/>
+          </p:cNvPicPr>
+          <p:nvPr/>
+        </p:nvPicPr>
+        <p:blipFill>
+          <a:blip r:embed="rId2">
+            <a:extLst>
+              <a:ext uri="{28A0092B-C50C-407E-A947-70E740481C1C}">
+                <a14:useLocalDpi xmlns:a14="http://schemas.microsoft.com/office/drawing/2010/main" val="0"/>
+              </a:ext>
+            </a:extLst>
+          </a:blip>
+          <a:stretch>
+            <a:fillRect/>
+          </a:stretch>
+        </p:blipFill>
+        <p:spPr>
+          <a:xfrm>
+            <a:off x="6418311" y="1600201"/>
+            <a:ext cx="1879720" cy="1309142"/>
+          </a:xfrm>
+          <a:prstGeom prst="rect">
+            <a:avLst/>
+          </a:prstGeom>
+        </p:spPr>
+      </p:pic>
+      <p:pic>
+        <p:nvPicPr>
+          <p:cNvPr id="6" name="Picture 5" descr="brain.png"/>
+          <p:cNvPicPr>
+            <a:picLocks noChangeAspect="1"/>
+          </p:cNvPicPr>
+          <p:nvPr/>
+        </p:nvPicPr>
+        <p:blipFill>
+          <a:blip r:embed="rId3">
+            <a:extLst>
+              <a:ext uri="{28A0092B-C50C-407E-A947-70E740481C1C}">
+                <a14:useLocalDpi xmlns:a14="http://schemas.microsoft.com/office/drawing/2010/main" val="0"/>
+              </a:ext>
+            </a:extLst>
+          </a:blip>
+          <a:stretch>
+            <a:fillRect/>
+          </a:stretch>
+        </p:blipFill>
+        <p:spPr>
+          <a:xfrm>
+            <a:off x="6418311" y="3075725"/>
+            <a:ext cx="1879720" cy="1351049"/>
+          </a:xfrm>
+          <a:prstGeom prst="rect">
+            <a:avLst/>
+          </a:prstGeom>
+        </p:spPr>
+      </p:pic>
+      <p:pic>
+        <p:nvPicPr>
+          <p:cNvPr id="7" name="Picture 6" descr="male_female_symbols.jpg"/>
+          <p:cNvPicPr>
+            <a:picLocks noChangeAspect="1"/>
+          </p:cNvPicPr>
+          <p:nvPr/>
+        </p:nvPicPr>
+        <p:blipFill>
+          <a:blip r:embed="rId4">
+            <a:alphaModFix/>
+            <a:extLst>
+              <a:ext uri="{28A0092B-C50C-407E-A947-70E740481C1C}">
+                <a14:useLocalDpi xmlns:a14="http://schemas.microsoft.com/office/drawing/2010/main" val="0"/>
+              </a:ext>
+            </a:extLst>
+          </a:blip>
+          <a:stretch>
+            <a:fillRect/>
+          </a:stretch>
+        </p:blipFill>
+        <p:spPr>
+          <a:xfrm>
+            <a:off x="6376342" y="4702877"/>
+            <a:ext cx="1921689" cy="1300343"/>
+          </a:xfrm>
+          <a:prstGeom prst="rect">
+            <a:avLst/>
+          </a:prstGeom>
+        </p:spPr>
+      </p:pic>
     </p:spTree>
     <p:extLst>
       <p:ext uri="{BB962C8B-B14F-4D97-AF65-F5344CB8AC3E}">
-        <p14:creationId xmlns:p14="http://schemas.microsoft.com/office/powerpoint/2010/main" val="474749496"/>
+        <p14:creationId xmlns:p14="http://schemas.microsoft.com/office/powerpoint/2010/main" val="2826141436"/>
       </p:ext>
     </p:extLst>
   </p:cSld>
@@ -4382,20 +5604,21 @@
             <p:ph type="title"/>
           </p:nvPr>
         </p:nvSpPr>
-        <p:spPr/>
-        <p:txBody>
-          <a:bodyPr/>
-          <a:lstStyle/>
-          <a:p>
-            <a:r>
-              <a:rPr lang="en-US" dirty="0" smtClean="0"/>
-              <a:t>ATAC-</a:t>
-            </a:r>
-            <a:r>
-              <a:rPr lang="en-US" dirty="0" err="1" smtClean="0"/>
-              <a:t>Seq</a:t>
-            </a:r>
-            <a:endParaRPr lang="en-US" dirty="0"/>
+        <p:spPr>
+          <a:xfrm>
+            <a:off x="549275" y="107576"/>
+            <a:ext cx="8042276" cy="1336956"/>
+          </a:xfrm>
+        </p:spPr>
+        <p:txBody>
+          <a:bodyPr/>
+          <a:lstStyle/>
+          <a:p>
+            <a:r>
+              <a:rPr lang="en-US" sz="3400" dirty="0" smtClean="0"/>
+              <a:t>Effect of PCBs on autism candidate genes via epigenetic marks</a:t>
+            </a:r>
+            <a:endParaRPr lang="en-US" sz="3400" dirty="0"/>
           </a:p>
         </p:txBody>
       </p:sp>
@@ -4421,7 +5644,86 @@
     </p:spTree>
     <p:extLst>
       <p:ext uri="{BB962C8B-B14F-4D97-AF65-F5344CB8AC3E}">
-        <p14:creationId xmlns:p14="http://schemas.microsoft.com/office/powerpoint/2010/main" val="3124503255"/>
+        <p14:creationId xmlns:p14="http://schemas.microsoft.com/office/powerpoint/2010/main" val="2731857222"/>
+      </p:ext>
+    </p:extLst>
+  </p:cSld>
+  <p:clrMapOvr>
+    <a:masterClrMapping/>
+  </p:clrMapOvr>
+</p:sld>
+</file>
+
+<file path=ppt/slides/slide9.xml><?xml version="1.0" encoding="utf-8"?>
+<p:sld xmlns:a="http://schemas.openxmlformats.org/drawingml/2006/main" xmlns:r="http://schemas.openxmlformats.org/officeDocument/2006/relationships" xmlns:p="http://schemas.openxmlformats.org/presentationml/2006/main">
+  <p:cSld>
+    <p:spTree>
+      <p:nvGrpSpPr>
+        <p:cNvPr id="1" name=""/>
+        <p:cNvGrpSpPr/>
+        <p:nvPr/>
+      </p:nvGrpSpPr>
+      <p:grpSpPr>
+        <a:xfrm>
+          <a:off x="0" y="0"/>
+          <a:ext cx="0" cy="0"/>
+          <a:chOff x="0" y="0"/>
+          <a:chExt cx="0" cy="0"/>
+        </a:xfrm>
+      </p:grpSpPr>
+      <p:sp>
+        <p:nvSpPr>
+          <p:cNvPr id="2" name="Title 1"/>
+          <p:cNvSpPr>
+            <a:spLocks noGrp="1"/>
+          </p:cNvSpPr>
+          <p:nvPr>
+            <p:ph type="title"/>
+          </p:nvPr>
+        </p:nvSpPr>
+        <p:spPr/>
+        <p:txBody>
+          <a:bodyPr/>
+          <a:lstStyle/>
+          <a:p>
+            <a:r>
+              <a:rPr lang="en-US" dirty="0" smtClean="0"/>
+              <a:t>Bisulfite Sequencing</a:t>
+            </a:r>
+            <a:endParaRPr lang="en-US" dirty="0"/>
+          </a:p>
+        </p:txBody>
+      </p:sp>
+      <p:sp>
+        <p:nvSpPr>
+          <p:cNvPr id="3" name="Content Placeholder 2"/>
+          <p:cNvSpPr>
+            <a:spLocks noGrp="1"/>
+          </p:cNvSpPr>
+          <p:nvPr>
+            <p:ph idx="1"/>
+          </p:nvPr>
+        </p:nvSpPr>
+        <p:spPr/>
+        <p:txBody>
+          <a:bodyPr/>
+          <a:lstStyle/>
+          <a:p>
+            <a:r>
+              <a:rPr lang="en-US" dirty="0" smtClean="0"/>
+              <a:t>Conversion efficiency</a:t>
+            </a:r>
+          </a:p>
+          <a:p>
+            <a:pPr lvl="1"/>
+            <a:endParaRPr lang="en-US" dirty="0"/>
+          </a:p>
+        </p:txBody>
+      </p:sp>
+    </p:spTree>
+    <p:extLst>
+      <p:ext uri="{BB962C8B-B14F-4D97-AF65-F5344CB8AC3E}">
+        <p14:creationId xmlns:p14="http://schemas.microsoft.com/office/powerpoint/2010/main" val="474749496"/>
       </p:ext>
     </p:extLst>
   </p:cSld>

</xml_diff>

<commit_message>
mostly done with slides; add small sample annotations
</commit_message>
<xml_diff>
--- a/KipnisLabMeeting_2017-03-13.pptx
+++ b/KipnisLabMeeting_2017-03-13.pptx
@@ -10,15 +10,16 @@
     <p:sldId id="258" r:id="rId4"/>
     <p:sldId id="269" r:id="rId5"/>
     <p:sldId id="259" r:id="rId6"/>
-    <p:sldId id="271" r:id="rId7"/>
-    <p:sldId id="260" r:id="rId8"/>
-    <p:sldId id="261" r:id="rId9"/>
-    <p:sldId id="262" r:id="rId10"/>
-    <p:sldId id="266" r:id="rId11"/>
-    <p:sldId id="263" r:id="rId12"/>
-    <p:sldId id="267" r:id="rId13"/>
-    <p:sldId id="270" r:id="rId14"/>
+    <p:sldId id="266" r:id="rId7"/>
+    <p:sldId id="271" r:id="rId8"/>
+    <p:sldId id="260" r:id="rId9"/>
+    <p:sldId id="261" r:id="rId10"/>
+    <p:sldId id="274" r:id="rId11"/>
+    <p:sldId id="262" r:id="rId12"/>
+    <p:sldId id="275" r:id="rId13"/>
+    <p:sldId id="273" r:id="rId14"/>
     <p:sldId id="268" r:id="rId15"/>
+    <p:sldId id="276" r:id="rId16"/>
   </p:sldIdLst>
   <p:sldSz cx="9144000" cy="6858000" type="screen4x3"/>
   <p:notesSz cx="6858000" cy="9144000"/>
@@ -3710,7 +3711,12 @@
             <p:ph type="subTitle" idx="1"/>
           </p:nvPr>
         </p:nvSpPr>
-        <p:spPr/>
+        <p:spPr>
+          <a:xfrm>
+            <a:off x="1322921" y="3523061"/>
+            <a:ext cx="6498159" cy="916641"/>
+          </a:xfrm>
+        </p:spPr>
         <p:txBody>
           <a:bodyPr>
             <a:normAutofit/>
@@ -3725,12 +3731,42 @@
           <a:p>
             <a:r>
               <a:rPr lang="en-US" dirty="0" smtClean="0"/>
-              <a:t>13 March 2017</a:t>
+              <a:t>14 March 2017</a:t>
             </a:r>
             <a:endParaRPr lang="en-US" dirty="0"/>
           </a:p>
         </p:txBody>
       </p:sp>
+      <p:pic>
+        <p:nvPicPr>
+          <p:cNvPr id="4" name="Picture 3" descr="epigenetics_logo.jpg"/>
+          <p:cNvPicPr>
+            <a:picLocks noChangeAspect="1"/>
+          </p:cNvPicPr>
+          <p:nvPr/>
+        </p:nvPicPr>
+        <p:blipFill>
+          <a:blip r:embed="rId2">
+            <a:extLst>
+              <a:ext uri="{28A0092B-C50C-407E-A947-70E740481C1C}">
+                <a14:useLocalDpi xmlns:a14="http://schemas.microsoft.com/office/drawing/2010/main" val="0"/>
+              </a:ext>
+            </a:extLst>
+          </a:blip>
+          <a:stretch>
+            <a:fillRect/>
+          </a:stretch>
+        </p:blipFill>
+        <p:spPr>
+          <a:xfrm>
+            <a:off x="2613626" y="4734367"/>
+            <a:ext cx="3895275" cy="1094247"/>
+          </a:xfrm>
+          <a:prstGeom prst="rect">
+            <a:avLst/>
+          </a:prstGeom>
+        </p:spPr>
+      </p:pic>
     </p:spTree>
     <p:extLst>
       <p:ext uri="{BB962C8B-B14F-4D97-AF65-F5344CB8AC3E}">
@@ -3771,14 +3807,19 @@
             <p:ph type="title"/>
           </p:nvPr>
         </p:nvSpPr>
-        <p:spPr/>
+        <p:spPr>
+          <a:xfrm>
+            <a:off x="442987" y="107576"/>
+            <a:ext cx="8283866" cy="1336956"/>
+          </a:xfrm>
+        </p:spPr>
         <p:txBody>
           <a:bodyPr/>
           <a:lstStyle/>
           <a:p>
             <a:r>
               <a:rPr lang="en-US" dirty="0" smtClean="0"/>
-              <a:t>Histone modifications</a:t>
+              <a:t>Non-uniform structural effect</a:t>
             </a:r>
             <a:endParaRPr lang="en-US" dirty="0"/>
           </a:p>
@@ -3794,54 +3835,71 @@
             <p:ph idx="1"/>
           </p:nvPr>
         </p:nvSpPr>
-        <p:spPr/>
-        <p:txBody>
-          <a:bodyPr/>
-          <a:lstStyle/>
-          <a:p>
-            <a:r>
-              <a:rPr lang="en-US" dirty="0" smtClean="0"/>
-              <a:t>Location</a:t>
-            </a:r>
-            <a:r>
-              <a:rPr lang="en-US" dirty="0"/>
-              <a:t>-dependent</a:t>
-            </a:r>
-          </a:p>
-          <a:p>
-            <a:pPr lvl="1"/>
-            <a:r>
-              <a:rPr lang="en-US" dirty="0" smtClean="0"/>
-              <a:t>H3K4me1 at enhancer</a:t>
-            </a:r>
-          </a:p>
-          <a:p>
-            <a:pPr lvl="1"/>
-            <a:r>
-              <a:rPr lang="en-US" dirty="0" smtClean="0"/>
-              <a:t>H3K4me3 at promoter</a:t>
-            </a:r>
-          </a:p>
-          <a:p>
-            <a:pPr lvl="1"/>
+        <p:spPr>
+          <a:xfrm>
+            <a:off x="549275" y="4194179"/>
+            <a:ext cx="7719825" cy="1521129"/>
+          </a:xfrm>
+        </p:spPr>
+        <p:txBody>
+          <a:bodyPr>
+            <a:normAutofit fontScale="92500" lnSpcReduction="10000"/>
+          </a:bodyPr>
+          <a:lstStyle/>
+          <a:p>
+            <a:r>
+              <a:rPr lang="en-US" dirty="0" smtClean="0"/>
+              <a:t>Inclusion of brain tissue from Down Syndrome</a:t>
+            </a:r>
+          </a:p>
+          <a:p>
+            <a:r>
+              <a:rPr lang="en-US" dirty="0" smtClean="0"/>
+              <a:t>Global and local differences</a:t>
+            </a:r>
+          </a:p>
+          <a:p>
+            <a:r>
+              <a:rPr lang="en-US" dirty="0" smtClean="0"/>
+              <a:t>Imprinting</a:t>
+            </a:r>
             <a:endParaRPr lang="en-US" dirty="0"/>
           </a:p>
-          <a:p>
-            <a:r>
-              <a:rPr lang="en-US" dirty="0" smtClean="0"/>
-              <a:t>Acetylation on tails general an activation mark</a:t>
-            </a:r>
-            <a:endParaRPr lang="en-US" dirty="0"/>
-          </a:p>
-          <a:p>
-            <a:endParaRPr lang="en-US" dirty="0"/>
-          </a:p>
-        </p:txBody>
-      </p:sp>
+        </p:txBody>
+      </p:sp>
+      <p:pic>
+        <p:nvPicPr>
+          <p:cNvPr id="4" name="Picture 3" descr="pwd-asd-2.jpg"/>
+          <p:cNvPicPr>
+            <a:picLocks noChangeAspect="1"/>
+          </p:cNvPicPr>
+          <p:nvPr/>
+        </p:nvPicPr>
+        <p:blipFill rotWithShape="1">
+          <a:blip r:embed="rId2">
+            <a:extLst>
+              <a:ext uri="{28A0092B-C50C-407E-A947-70E740481C1C}">
+                <a14:useLocalDpi xmlns:a14="http://schemas.microsoft.com/office/drawing/2010/main" val="0"/>
+              </a:ext>
+            </a:extLst>
+          </a:blip>
+          <a:srcRect t="45372"/>
+          <a:stretch/>
+        </p:blipFill>
+        <p:spPr>
+          <a:xfrm>
+            <a:off x="1535690" y="1600200"/>
+            <a:ext cx="5467473" cy="2301717"/>
+          </a:xfrm>
+          <a:prstGeom prst="rect">
+            <a:avLst/>
+          </a:prstGeom>
+        </p:spPr>
+      </p:pic>
     </p:spTree>
     <p:extLst>
       <p:ext uri="{BB962C8B-B14F-4D97-AF65-F5344CB8AC3E}">
-        <p14:creationId xmlns:p14="http://schemas.microsoft.com/office/powerpoint/2010/main" val="2882511342"/>
+        <p14:creationId xmlns:p14="http://schemas.microsoft.com/office/powerpoint/2010/main" val="1430156675"/>
       </p:ext>
     </p:extLst>
   </p:cSld>
@@ -3884,31 +3942,8 @@
           <a:lstStyle/>
           <a:p>
             <a:r>
-              <a:rPr lang="en-US" sz="3200" dirty="0" smtClean="0"/>
-              <a:t>Whole-genome vs. Reduced-representation</a:t>
-            </a:r>
-            <a:endParaRPr lang="en-US" sz="3200" dirty="0"/>
-          </a:p>
-        </p:txBody>
-      </p:sp>
-      <p:sp>
-        <p:nvSpPr>
-          <p:cNvPr id="6" name="Text Placeholder 5"/>
-          <p:cNvSpPr>
-            <a:spLocks noGrp="1"/>
-          </p:cNvSpPr>
-          <p:nvPr>
-            <p:ph type="body" idx="1"/>
-          </p:nvPr>
-        </p:nvSpPr>
-        <p:spPr/>
-        <p:txBody>
-          <a:bodyPr/>
-          <a:lstStyle/>
-          <a:p>
-            <a:r>
-              <a:rPr lang="en-US" dirty="0" smtClean="0"/>
-              <a:t>WGBS</a:t>
+              <a:rPr lang="en-US" dirty="0" smtClean="0"/>
+              <a:t>Bisulfite Sequencing</a:t>
             </a:r>
             <a:endParaRPr lang="en-US" dirty="0"/>
           </a:p>
@@ -3916,69 +3951,115 @@
       </p:sp>
       <p:sp>
         <p:nvSpPr>
-          <p:cNvPr id="7" name="Content Placeholder 6"/>
-          <p:cNvSpPr>
-            <a:spLocks noGrp="1"/>
-          </p:cNvSpPr>
-          <p:nvPr>
-            <p:ph sz="half" idx="2"/>
-          </p:nvPr>
-        </p:nvSpPr>
-        <p:spPr/>
-        <p:txBody>
-          <a:bodyPr/>
-          <a:lstStyle/>
-          <a:p>
-            <a:endParaRPr lang="en-US"/>
-          </a:p>
-        </p:txBody>
-      </p:sp>
-      <p:sp>
-        <p:nvSpPr>
-          <p:cNvPr id="8" name="Text Placeholder 7"/>
-          <p:cNvSpPr>
-            <a:spLocks noGrp="1"/>
-          </p:cNvSpPr>
-          <p:nvPr>
-            <p:ph type="body" sz="quarter" idx="3"/>
-          </p:nvPr>
-        </p:nvSpPr>
-        <p:spPr/>
-        <p:txBody>
-          <a:bodyPr/>
-          <a:lstStyle/>
-          <a:p>
-            <a:r>
-              <a:rPr lang="en-US" dirty="0" smtClean="0"/>
-              <a:t>RRBS</a:t>
-            </a:r>
+          <p:cNvPr id="3" name="Content Placeholder 2"/>
+          <p:cNvSpPr>
+            <a:spLocks noGrp="1"/>
+          </p:cNvSpPr>
+          <p:nvPr>
+            <p:ph idx="1"/>
+          </p:nvPr>
+        </p:nvSpPr>
+        <p:spPr>
+          <a:xfrm>
+            <a:off x="815067" y="4784909"/>
+            <a:ext cx="7634151" cy="1586970"/>
+          </a:xfrm>
+        </p:spPr>
+        <p:txBody>
+          <a:bodyPr numCol="2">
+            <a:normAutofit fontScale="85000" lnSpcReduction="20000"/>
+          </a:bodyPr>
+          <a:lstStyle/>
+          <a:p>
+            <a:r>
+              <a:rPr lang="en-US" dirty="0" smtClean="0"/>
+              <a:t>Conversion efficiency</a:t>
+            </a:r>
+          </a:p>
+          <a:p>
+            <a:pPr lvl="1"/>
+            <a:r>
+              <a:rPr lang="en-US" dirty="0" smtClean="0"/>
+              <a:t>Spike-in control</a:t>
+            </a:r>
+          </a:p>
+          <a:p>
+            <a:pPr lvl="1"/>
+            <a:r>
+              <a:rPr lang="en-US" dirty="0" smtClean="0"/>
+              <a:t>Typically &gt; 99%</a:t>
+            </a:r>
+          </a:p>
+          <a:p>
+            <a:endParaRPr lang="en-US" dirty="0" smtClean="0"/>
+          </a:p>
+          <a:p>
+            <a:r>
+              <a:rPr lang="en-US" dirty="0" smtClean="0"/>
+              <a:t>Derivatives</a:t>
+            </a:r>
+          </a:p>
+          <a:p>
+            <a:pPr lvl="1"/>
+            <a:r>
+              <a:rPr lang="en-US" dirty="0" smtClean="0"/>
+              <a:t>5hmC</a:t>
+            </a:r>
+          </a:p>
+          <a:p>
+            <a:pPr lvl="1"/>
+            <a:r>
+              <a:rPr lang="en-US" dirty="0" smtClean="0"/>
+              <a:t>5fC, 5caC</a:t>
+            </a:r>
+          </a:p>
+          <a:p>
+            <a:pPr lvl="1"/>
+            <a:r>
+              <a:rPr lang="en-US" dirty="0" smtClean="0"/>
+              <a:t>Oxidative bisulfite sequencing (ox-BS)</a:t>
+            </a:r>
+          </a:p>
+          <a:p>
+            <a:pPr lvl="1"/>
             <a:endParaRPr lang="en-US" dirty="0"/>
           </a:p>
         </p:txBody>
       </p:sp>
-      <p:sp>
-        <p:nvSpPr>
-          <p:cNvPr id="9" name="Content Placeholder 8"/>
-          <p:cNvSpPr>
-            <a:spLocks noGrp="1"/>
-          </p:cNvSpPr>
-          <p:nvPr>
-            <p:ph sz="quarter" idx="4"/>
-          </p:nvPr>
-        </p:nvSpPr>
-        <p:spPr/>
-        <p:txBody>
-          <a:bodyPr/>
-          <a:lstStyle/>
-          <a:p>
-            <a:endParaRPr lang="en-US" dirty="0"/>
-          </a:p>
-        </p:txBody>
-      </p:sp>
+      <p:pic>
+        <p:nvPicPr>
+          <p:cNvPr id="4" name="Picture 3" descr="bisulfite_sequencing.png"/>
+          <p:cNvPicPr>
+            <a:picLocks noChangeAspect="1"/>
+          </p:cNvPicPr>
+          <p:nvPr/>
+        </p:nvPicPr>
+        <p:blipFill>
+          <a:blip r:embed="rId2">
+            <a:extLst>
+              <a:ext uri="{28A0092B-C50C-407E-A947-70E740481C1C}">
+                <a14:useLocalDpi xmlns:a14="http://schemas.microsoft.com/office/drawing/2010/main" val="0"/>
+              </a:ext>
+            </a:extLst>
+          </a:blip>
+          <a:stretch>
+            <a:fillRect/>
+          </a:stretch>
+        </p:blipFill>
+        <p:spPr>
+          <a:xfrm>
+            <a:off x="1033637" y="1990957"/>
+            <a:ext cx="6655428" cy="2464153"/>
+          </a:xfrm>
+          <a:prstGeom prst="rect">
+            <a:avLst/>
+          </a:prstGeom>
+        </p:spPr>
+      </p:pic>
     </p:spTree>
     <p:extLst>
       <p:ext uri="{BB962C8B-B14F-4D97-AF65-F5344CB8AC3E}">
-        <p14:creationId xmlns:p14="http://schemas.microsoft.com/office/powerpoint/2010/main" val="721065945"/>
+        <p14:creationId xmlns:p14="http://schemas.microsoft.com/office/powerpoint/2010/main" val="474749496"/>
       </p:ext>
     </p:extLst>
   </p:cSld>
@@ -4022,7 +4103,7 @@
           <a:p>
             <a:r>
               <a:rPr lang="en-US" dirty="0" smtClean="0"/>
-              <a:t>Aging</a:t>
+              <a:t>WGBS &amp; RRBS</a:t>
             </a:r>
             <a:endParaRPr lang="en-US" dirty="0"/>
           </a:p>
@@ -4030,84 +4111,244 @@
       </p:sp>
       <p:sp>
         <p:nvSpPr>
-          <p:cNvPr id="3" name="Text Placeholder 2"/>
-          <p:cNvSpPr>
-            <a:spLocks noGrp="1"/>
-          </p:cNvSpPr>
-          <p:nvPr>
-            <p:ph type="body" idx="1"/>
-          </p:nvPr>
-        </p:nvSpPr>
-        <p:spPr/>
-        <p:txBody>
-          <a:bodyPr/>
-          <a:lstStyle/>
-          <a:p>
-            <a:endParaRPr lang="en-US"/>
-          </a:p>
-        </p:txBody>
-      </p:sp>
-      <p:sp>
-        <p:nvSpPr>
-          <p:cNvPr id="4" name="Content Placeholder 3"/>
-          <p:cNvSpPr>
-            <a:spLocks noGrp="1"/>
-          </p:cNvSpPr>
-          <p:nvPr>
-            <p:ph sz="half" idx="2"/>
-          </p:nvPr>
-        </p:nvSpPr>
-        <p:spPr/>
-        <p:txBody>
-          <a:bodyPr/>
-          <a:lstStyle/>
-          <a:p>
-            <a:endParaRPr lang="en-US"/>
-          </a:p>
-        </p:txBody>
-      </p:sp>
-      <p:sp>
-        <p:nvSpPr>
-          <p:cNvPr id="5" name="Text Placeholder 4"/>
-          <p:cNvSpPr>
-            <a:spLocks noGrp="1"/>
-          </p:cNvSpPr>
-          <p:nvPr>
-            <p:ph type="body" sz="quarter" idx="3"/>
-          </p:nvPr>
-        </p:nvSpPr>
-        <p:spPr/>
-        <p:txBody>
-          <a:bodyPr/>
-          <a:lstStyle/>
-          <a:p>
-            <a:endParaRPr lang="en-US"/>
-          </a:p>
-        </p:txBody>
-      </p:sp>
-      <p:sp>
-        <p:nvSpPr>
-          <p:cNvPr id="6" name="Content Placeholder 5"/>
-          <p:cNvSpPr>
-            <a:spLocks noGrp="1"/>
-          </p:cNvSpPr>
-          <p:nvPr>
-            <p:ph sz="quarter" idx="4"/>
-          </p:nvPr>
-        </p:nvSpPr>
-        <p:spPr/>
-        <p:txBody>
-          <a:bodyPr/>
-          <a:lstStyle/>
-          <a:p>
-            <a:endParaRPr lang="en-US"/>
-          </a:p>
-        </p:txBody>
-      </p:sp>
+          <p:cNvPr id="3" name="Content Placeholder 2"/>
+          <p:cNvSpPr>
+            <a:spLocks noGrp="1"/>
+          </p:cNvSpPr>
+          <p:nvPr>
+            <p:ph idx="1"/>
+          </p:nvPr>
+        </p:nvSpPr>
+        <p:spPr>
+          <a:xfrm>
+            <a:off x="2291693" y="1930334"/>
+            <a:ext cx="4545081" cy="4343400"/>
+          </a:xfrm>
+        </p:spPr>
+        <p:txBody>
+          <a:bodyPr>
+            <a:normAutofit lnSpcReduction="10000"/>
+          </a:bodyPr>
+          <a:lstStyle/>
+          <a:p>
+            <a:r>
+              <a:rPr lang="en-US" dirty="0" err="1" smtClean="0"/>
+              <a:t>CpG</a:t>
+            </a:r>
+            <a:r>
+              <a:rPr lang="en-US" dirty="0" smtClean="0"/>
+              <a:t> occurs much less often than expected by chance (&lt; 1% vs. ~4.5%)</a:t>
+            </a:r>
+          </a:p>
+          <a:p>
+            <a:r>
+              <a:rPr lang="en-US" dirty="0" smtClean="0"/>
+              <a:t>Hypothesis: 5mC </a:t>
+            </a:r>
+            <a:r>
+              <a:rPr lang="en-US" dirty="0" smtClean="0">
+                <a:sym typeface="Wingdings"/>
+              </a:rPr>
+              <a:t> T</a:t>
+            </a:r>
+          </a:p>
+          <a:p>
+            <a:r>
+              <a:rPr lang="en-US" dirty="0"/>
+              <a:t>Information/cost trade-</a:t>
+            </a:r>
+            <a:r>
+              <a:rPr lang="en-US" dirty="0" smtClean="0"/>
+              <a:t>off</a:t>
+            </a:r>
+          </a:p>
+          <a:p>
+            <a:r>
+              <a:rPr lang="en-US" dirty="0" smtClean="0"/>
+              <a:t>Some novelty sacrifice</a:t>
+            </a:r>
+            <a:endParaRPr lang="en-US" dirty="0"/>
+          </a:p>
+          <a:p>
+            <a:r>
+              <a:rPr lang="en-US" dirty="0" smtClean="0">
+                <a:sym typeface="Wingdings"/>
+              </a:rPr>
+              <a:t>RRBS much cheaper</a:t>
+            </a:r>
+          </a:p>
+          <a:p>
+            <a:pPr lvl="1"/>
+            <a:r>
+              <a:rPr lang="en-US" dirty="0" smtClean="0">
+                <a:sym typeface="Wingdings"/>
+              </a:rPr>
+              <a:t>$: </a:t>
+            </a:r>
+            <a:r>
+              <a:rPr lang="en-US" dirty="0" err="1" smtClean="0">
+                <a:sym typeface="Wingdings"/>
+              </a:rPr>
+              <a:t>Mspl</a:t>
+            </a:r>
+            <a:r>
+              <a:rPr lang="en-US" dirty="0" smtClean="0">
+                <a:sym typeface="Wingdings"/>
+              </a:rPr>
+              <a:t> recognizes </a:t>
+            </a:r>
+            <a:r>
+              <a:rPr lang="en-US" dirty="0" err="1" smtClean="0">
+                <a:sym typeface="Wingdings"/>
+              </a:rPr>
+              <a:t>CpG</a:t>
+            </a:r>
+            <a:endParaRPr lang="en-US" dirty="0" smtClean="0">
+              <a:sym typeface="Wingdings"/>
+            </a:endParaRPr>
+          </a:p>
+          <a:p>
+            <a:pPr lvl="1"/>
+            <a:r>
+              <a:rPr lang="en-US" dirty="0" smtClean="0">
+                <a:sym typeface="Wingdings"/>
+              </a:rPr>
+              <a:t>t: fewer data observations</a:t>
+            </a:r>
+          </a:p>
+          <a:p>
+            <a:pPr lvl="1"/>
+            <a:endParaRPr lang="en-US" dirty="0" smtClean="0"/>
+          </a:p>
+          <a:p>
+            <a:endParaRPr lang="en-US" dirty="0"/>
+          </a:p>
+        </p:txBody>
+      </p:sp>
+      <p:pic>
+        <p:nvPicPr>
+          <p:cNvPr id="4" name="Picture 3" descr="scales.png"/>
+          <p:cNvPicPr>
+            <a:picLocks noChangeAspect="1"/>
+          </p:cNvPicPr>
+          <p:nvPr/>
+        </p:nvPicPr>
+        <p:blipFill>
+          <a:blip r:embed="rId2">
+            <a:extLst>
+              <a:ext uri="{28A0092B-C50C-407E-A947-70E740481C1C}">
+                <a14:useLocalDpi xmlns:a14="http://schemas.microsoft.com/office/drawing/2010/main" val="0"/>
+              </a:ext>
+            </a:extLst>
+          </a:blip>
+          <a:stretch>
+            <a:fillRect/>
+          </a:stretch>
+        </p:blipFill>
+        <p:spPr>
+          <a:xfrm>
+            <a:off x="770768" y="1930334"/>
+            <a:ext cx="927351" cy="1078938"/>
+          </a:xfrm>
+          <a:prstGeom prst="rect">
+            <a:avLst/>
+          </a:prstGeom>
+        </p:spPr>
+      </p:pic>
+      <p:pic>
+        <p:nvPicPr>
+          <p:cNvPr id="5" name="Picture 4" descr="data.jpg"/>
+          <p:cNvPicPr>
+            <a:picLocks noChangeAspect="1"/>
+          </p:cNvPicPr>
+          <p:nvPr/>
+        </p:nvPicPr>
+        <p:blipFill>
+          <a:blip r:embed="rId3">
+            <a:extLst>
+              <a:ext uri="{28A0092B-C50C-407E-A947-70E740481C1C}">
+                <a14:useLocalDpi xmlns:a14="http://schemas.microsoft.com/office/drawing/2010/main" val="0"/>
+              </a:ext>
+            </a:extLst>
+          </a:blip>
+          <a:stretch>
+            <a:fillRect/>
+          </a:stretch>
+        </p:blipFill>
+        <p:spPr>
+          <a:xfrm>
+            <a:off x="334543" y="4416525"/>
+            <a:ext cx="1629369" cy="1064956"/>
+          </a:xfrm>
+          <a:prstGeom prst="rect">
+            <a:avLst/>
+          </a:prstGeom>
+        </p:spPr>
+      </p:pic>
+      <p:pic>
+        <p:nvPicPr>
+          <p:cNvPr id="6" name="Picture 5" descr="time.jpg"/>
+          <p:cNvPicPr>
+            <a:picLocks noChangeAspect="1"/>
+          </p:cNvPicPr>
+          <p:nvPr/>
+        </p:nvPicPr>
+        <p:blipFill>
+          <a:blip r:embed="rId4">
+            <a:extLst>
+              <a:ext uri="{28A0092B-C50C-407E-A947-70E740481C1C}">
+                <a14:useLocalDpi xmlns:a14="http://schemas.microsoft.com/office/drawing/2010/main" val="0"/>
+              </a:ext>
+            </a:extLst>
+          </a:blip>
+          <a:stretch>
+            <a:fillRect/>
+          </a:stretch>
+        </p:blipFill>
+        <p:spPr>
+          <a:xfrm>
+            <a:off x="6978525" y="4416526"/>
+            <a:ext cx="1840616" cy="1064956"/>
+          </a:xfrm>
+          <a:prstGeom prst="rect">
+            <a:avLst/>
+          </a:prstGeom>
+        </p:spPr>
+      </p:pic>
+      <p:pic>
+        <p:nvPicPr>
+          <p:cNvPr id="7" name="Picture 6" descr="money.jpg"/>
+          <p:cNvPicPr>
+            <a:picLocks noChangeAspect="1"/>
+          </p:cNvPicPr>
+          <p:nvPr/>
+        </p:nvPicPr>
+        <p:blipFill>
+          <a:blip r:embed="rId5">
+            <a:extLst>
+              <a:ext uri="{28A0092B-C50C-407E-A947-70E740481C1C}">
+                <a14:useLocalDpi xmlns:a14="http://schemas.microsoft.com/office/drawing/2010/main" val="0"/>
+              </a:ext>
+            </a:extLst>
+          </a:blip>
+          <a:stretch>
+            <a:fillRect/>
+          </a:stretch>
+        </p:blipFill>
+        <p:spPr>
+          <a:xfrm>
+            <a:off x="7227145" y="2152523"/>
+            <a:ext cx="1364406" cy="1364406"/>
+          </a:xfrm>
+          <a:prstGeom prst="rect">
+            <a:avLst/>
+          </a:prstGeom>
+        </p:spPr>
+      </p:pic>
     </p:spTree>
     <p:extLst>
       <p:ext uri="{BB962C8B-B14F-4D97-AF65-F5344CB8AC3E}">
-        <p14:creationId xmlns:p14="http://schemas.microsoft.com/office/powerpoint/2010/main" val="1998530238"/>
+        <p14:creationId xmlns:p14="http://schemas.microsoft.com/office/powerpoint/2010/main" val="3493525346"/>
       </p:ext>
     </p:extLst>
   </p:cSld>
@@ -4150,8 +4391,8 @@
           <a:lstStyle/>
           <a:p>
             <a:r>
-              <a:rPr lang="en-US" dirty="0" err="1" smtClean="0"/>
-              <a:t>Methclone</a:t>
+              <a:rPr lang="en-US" dirty="0" smtClean="0"/>
+              <a:t>Processing methylation</a:t>
             </a:r>
             <a:endParaRPr lang="en-US" dirty="0"/>
           </a:p>
@@ -4159,84 +4400,107 @@
       </p:sp>
       <p:sp>
         <p:nvSpPr>
-          <p:cNvPr id="3" name="Text Placeholder 2"/>
-          <p:cNvSpPr>
-            <a:spLocks noGrp="1"/>
-          </p:cNvSpPr>
-          <p:nvPr>
-            <p:ph type="body" idx="1"/>
-          </p:nvPr>
-        </p:nvSpPr>
-        <p:spPr/>
-        <p:txBody>
-          <a:bodyPr/>
-          <a:lstStyle/>
-          <a:p>
-            <a:endParaRPr lang="en-US"/>
-          </a:p>
-        </p:txBody>
-      </p:sp>
-      <p:sp>
-        <p:nvSpPr>
-          <p:cNvPr id="4" name="Content Placeholder 3"/>
-          <p:cNvSpPr>
-            <a:spLocks noGrp="1"/>
-          </p:cNvSpPr>
-          <p:nvPr>
-            <p:ph sz="half" idx="2"/>
-          </p:nvPr>
-        </p:nvSpPr>
-        <p:spPr/>
-        <p:txBody>
-          <a:bodyPr/>
-          <a:lstStyle/>
-          <a:p>
-            <a:endParaRPr lang="en-US"/>
-          </a:p>
-        </p:txBody>
-      </p:sp>
-      <p:sp>
-        <p:nvSpPr>
-          <p:cNvPr id="5" name="Text Placeholder 4"/>
-          <p:cNvSpPr>
-            <a:spLocks noGrp="1"/>
-          </p:cNvSpPr>
-          <p:nvPr>
-            <p:ph type="body" sz="quarter" idx="3"/>
-          </p:nvPr>
-        </p:nvSpPr>
-        <p:spPr/>
-        <p:txBody>
-          <a:bodyPr/>
-          <a:lstStyle/>
-          <a:p>
-            <a:endParaRPr lang="en-US"/>
-          </a:p>
-        </p:txBody>
-      </p:sp>
-      <p:sp>
-        <p:nvSpPr>
-          <p:cNvPr id="6" name="Content Placeholder 5"/>
-          <p:cNvSpPr>
-            <a:spLocks noGrp="1"/>
-          </p:cNvSpPr>
-          <p:nvPr>
-            <p:ph sz="quarter" idx="4"/>
-          </p:nvPr>
-        </p:nvSpPr>
-        <p:spPr/>
-        <p:txBody>
-          <a:bodyPr/>
-          <a:lstStyle/>
-          <a:p>
-            <a:endParaRPr lang="en-US"/>
+          <p:cNvPr id="3" name="Content Placeholder 2"/>
+          <p:cNvSpPr>
+            <a:spLocks noGrp="1"/>
+          </p:cNvSpPr>
+          <p:nvPr>
+            <p:ph idx="1"/>
+          </p:nvPr>
+        </p:nvSpPr>
+        <p:spPr>
+          <a:xfrm>
+            <a:off x="549275" y="1733115"/>
+            <a:ext cx="3851067" cy="4343400"/>
+          </a:xfrm>
+        </p:spPr>
+        <p:txBody>
+          <a:bodyPr>
+            <a:normAutofit fontScale="92500" lnSpcReduction="10000"/>
+          </a:bodyPr>
+          <a:lstStyle/>
+          <a:p>
+            <a:r>
+              <a:rPr lang="en-US" dirty="0" smtClean="0"/>
+              <a:t>Axes for inquiry</a:t>
+            </a:r>
+          </a:p>
+          <a:p>
+            <a:pPr lvl="1"/>
+            <a:r>
+              <a:rPr lang="en-US" dirty="0" smtClean="0"/>
+              <a:t>Age</a:t>
+            </a:r>
+          </a:p>
+          <a:p>
+            <a:pPr lvl="1"/>
+            <a:r>
+              <a:rPr lang="en-US" dirty="0" smtClean="0"/>
+              <a:t>Cell type</a:t>
+            </a:r>
+          </a:p>
+          <a:p>
+            <a:pPr lvl="1"/>
+            <a:r>
+              <a:rPr lang="en-US" dirty="0" smtClean="0"/>
+              <a:t>Tissue region</a:t>
+            </a:r>
+          </a:p>
+          <a:p>
+            <a:pPr lvl="1"/>
+            <a:r>
+              <a:rPr lang="en-US" dirty="0" smtClean="0"/>
+              <a:t>Over time</a:t>
+            </a:r>
+          </a:p>
+          <a:p>
+            <a:pPr lvl="1"/>
+            <a:r>
+              <a:rPr lang="en-US" dirty="0" smtClean="0"/>
+              <a:t>Condition/phenotype</a:t>
+            </a:r>
+          </a:p>
+          <a:p>
+            <a:r>
+              <a:rPr lang="en-US" dirty="0" smtClean="0"/>
+              <a:t>Steps</a:t>
+            </a:r>
+          </a:p>
+          <a:p>
+            <a:pPr lvl="1"/>
+            <a:r>
+              <a:rPr lang="en-US" dirty="0" smtClean="0"/>
+              <a:t>Filter/trim</a:t>
+            </a:r>
+          </a:p>
+          <a:p>
+            <a:pPr lvl="1"/>
+            <a:r>
+              <a:rPr lang="en-US" dirty="0" smtClean="0"/>
+              <a:t>Align</a:t>
+            </a:r>
+          </a:p>
+          <a:p>
+            <a:pPr lvl="1"/>
+            <a:r>
+              <a:rPr lang="en-US" dirty="0" smtClean="0"/>
+              <a:t>Call methylation</a:t>
+            </a:r>
+          </a:p>
+          <a:p>
+            <a:pPr lvl="1"/>
+            <a:r>
+              <a:rPr lang="en-US" dirty="0" smtClean="0"/>
+              <a:t>Further analysis</a:t>
+            </a:r>
+            <a:endParaRPr lang="en-US" dirty="0"/>
           </a:p>
         </p:txBody>
       </p:sp>
     </p:spTree>
     <p:extLst>
       <p:ext uri="{BB962C8B-B14F-4D97-AF65-F5344CB8AC3E}">
-        <p14:creationId xmlns:p14="http://schemas.microsoft.com/office/powerpoint/2010/main" val="1838994199"/>
+        <p14:creationId xmlns:p14="http://schemas.microsoft.com/office/powerpoint/2010/main" val="807263351"/>
       </p:ext>
     </p:extLst>
   </p:cSld>
@@ -4413,6 +4677,94 @@
     <p:extLst>
       <p:ext uri="{BB962C8B-B14F-4D97-AF65-F5344CB8AC3E}">
         <p14:creationId xmlns:p14="http://schemas.microsoft.com/office/powerpoint/2010/main" val="2796789836"/>
+      </p:ext>
+    </p:extLst>
+  </p:cSld>
+  <p:clrMapOvr>
+    <a:masterClrMapping/>
+  </p:clrMapOvr>
+</p:sld>
+</file>
+
+<file path=ppt/slides/slide15.xml><?xml version="1.0" encoding="utf-8"?>
+<p:sld xmlns:a="http://schemas.openxmlformats.org/drawingml/2006/main" xmlns:r="http://schemas.openxmlformats.org/officeDocument/2006/relationships" xmlns:p="http://schemas.openxmlformats.org/presentationml/2006/main">
+  <p:cSld>
+    <p:spTree>
+      <p:nvGrpSpPr>
+        <p:cNvPr id="1" name=""/>
+        <p:cNvGrpSpPr/>
+        <p:nvPr/>
+      </p:nvGrpSpPr>
+      <p:grpSpPr>
+        <a:xfrm>
+          <a:off x="0" y="0"/>
+          <a:ext cx="0" cy="0"/>
+          <a:chOff x="0" y="0"/>
+          <a:chExt cx="0" cy="0"/>
+        </a:xfrm>
+      </p:grpSpPr>
+      <p:sp>
+        <p:nvSpPr>
+          <p:cNvPr id="2" name="Title 1"/>
+          <p:cNvSpPr>
+            <a:spLocks noGrp="1"/>
+          </p:cNvSpPr>
+          <p:nvPr>
+            <p:ph type="title"/>
+          </p:nvPr>
+        </p:nvSpPr>
+        <p:spPr>
+          <a:xfrm>
+            <a:off x="549274" y="4311280"/>
+            <a:ext cx="8042276" cy="1336956"/>
+          </a:xfrm>
+        </p:spPr>
+        <p:txBody>
+          <a:bodyPr/>
+          <a:lstStyle/>
+          <a:p>
+            <a:r>
+              <a:rPr lang="en-US" dirty="0" smtClean="0"/>
+              <a:t>Thank you for listening</a:t>
+            </a:r>
+            <a:endParaRPr lang="en-US" dirty="0"/>
+          </a:p>
+        </p:txBody>
+      </p:sp>
+      <p:pic>
+        <p:nvPicPr>
+          <p:cNvPr id="4" name="Content Placeholder 3" descr="waddington_landscape.jpg"/>
+          <p:cNvPicPr>
+            <a:picLocks noGrp="1" noChangeAspect="1"/>
+          </p:cNvPicPr>
+          <p:nvPr>
+            <p:ph idx="1"/>
+          </p:nvPr>
+        </p:nvPicPr>
+        <p:blipFill>
+          <a:blip r:embed="rId2">
+            <a:extLst>
+              <a:ext uri="{28A0092B-C50C-407E-A947-70E740481C1C}">
+                <a14:useLocalDpi xmlns:a14="http://schemas.microsoft.com/office/drawing/2010/main" val="0"/>
+              </a:ext>
+            </a:extLst>
+          </a:blip>
+          <a:srcRect t="7989" b="7989"/>
+          <a:stretch>
+            <a:fillRect/>
+          </a:stretch>
+        </p:blipFill>
+        <p:spPr>
+          <a:xfrm>
+            <a:off x="1373261" y="622354"/>
+            <a:ext cx="6568575" cy="3547497"/>
+          </a:xfrm>
+        </p:spPr>
+      </p:pic>
+    </p:spTree>
+    <p:extLst>
+      <p:ext uri="{BB962C8B-B14F-4D97-AF65-F5344CB8AC3E}">
+        <p14:creationId xmlns:p14="http://schemas.microsoft.com/office/powerpoint/2010/main" val="1811860931"/>
       </p:ext>
     </p:extLst>
   </p:cSld>
@@ -5258,16 +5610,16 @@
           <a:lstStyle/>
           <a:p>
             <a:r>
-              <a:rPr lang="en-US" sz="4400" dirty="0" smtClean="0"/>
-              <a:t>DNA Methylation, specifically</a:t>
-            </a:r>
-            <a:endParaRPr lang="en-US" sz="4400" dirty="0"/>
-          </a:p>
-        </p:txBody>
-      </p:sp>
-      <p:sp>
-        <p:nvSpPr>
-          <p:cNvPr id="5" name="Content Placeholder 4"/>
+              <a:rPr lang="en-US" dirty="0" smtClean="0"/>
+              <a:t>Histones, briefly</a:t>
+            </a:r>
+            <a:endParaRPr lang="en-US" dirty="0"/>
+          </a:p>
+        </p:txBody>
+      </p:sp>
+      <p:sp>
+        <p:nvSpPr>
+          <p:cNvPr id="3" name="Content Placeholder 2"/>
           <p:cNvSpPr>
             <a:spLocks noGrp="1"/>
           </p:cNvSpPr>
@@ -5277,81 +5629,83 @@
         </p:nvSpPr>
         <p:spPr>
           <a:xfrm>
-            <a:off x="416379" y="1600201"/>
-            <a:ext cx="4412185" cy="4343400"/>
-          </a:xfrm>
-        </p:spPr>
-        <p:txBody>
-          <a:bodyPr>
-            <a:normAutofit fontScale="92500" lnSpcReduction="10000"/>
+            <a:off x="724064" y="4238484"/>
+            <a:ext cx="7675526" cy="2015249"/>
+          </a:xfrm>
+        </p:spPr>
+        <p:txBody>
+          <a:bodyPr numCol="2">
+            <a:normAutofit fontScale="92500"/>
           </a:bodyPr>
           <a:lstStyle/>
           <a:p>
             <a:r>
+              <a:rPr lang="en-US" dirty="0" smtClean="0"/>
+              <a:t>Location</a:t>
+            </a:r>
+            <a:r>
               <a:rPr lang="en-US" dirty="0"/>
-              <a:t>Much of mature genome is methylated</a:t>
+              <a:t>-dependent</a:t>
             </a:r>
           </a:p>
           <a:p>
             <a:pPr lvl="1"/>
             <a:r>
-              <a:rPr lang="en-US" dirty="0"/>
-              <a:t>Interest in epigenetic landscape during development</a:t>
+              <a:rPr lang="en-US" dirty="0" smtClean="0"/>
+              <a:t>H3K4me1 at enhancer</a:t>
             </a:r>
           </a:p>
           <a:p>
             <a:pPr lvl="1"/>
             <a:r>
-              <a:rPr lang="en-US" dirty="0"/>
-              <a:t>Methylation changes are maintained/stable (DNMT)</a:t>
-            </a:r>
-          </a:p>
-          <a:p>
-            <a:pPr lvl="2"/>
-            <a:r>
-              <a:rPr lang="en-US" dirty="0"/>
-              <a:t>De </a:t>
-            </a:r>
-            <a:r>
-              <a:rPr lang="en-US" dirty="0" smtClean="0"/>
-              <a:t>novo: DNMT3A/B</a:t>
-            </a:r>
-          </a:p>
-          <a:p>
-            <a:pPr lvl="2"/>
-            <a:r>
-              <a:rPr lang="en-US" dirty="0" smtClean="0"/>
-              <a:t>Maintenance: DNMT1</a:t>
+              <a:rPr lang="en-US" dirty="0" smtClean="0"/>
+              <a:t>H3K4me3 at promoter</a:t>
+            </a:r>
+          </a:p>
+          <a:p>
+            <a:endParaRPr lang="en-US" dirty="0" smtClean="0"/>
+          </a:p>
+          <a:p>
+            <a:r>
+              <a:rPr lang="en-US" dirty="0" smtClean="0"/>
+              <a:t>Different additives</a:t>
+            </a:r>
+          </a:p>
+          <a:p>
+            <a:pPr lvl="1"/>
+            <a:r>
+              <a:rPr lang="en-US" dirty="0" smtClean="0"/>
+              <a:t>me, ac, </a:t>
+            </a:r>
+            <a:r>
+              <a:rPr lang="en-US" dirty="0" err="1" smtClean="0"/>
+              <a:t>ub</a:t>
+            </a:r>
+            <a:endParaRPr lang="en-US" dirty="0" smtClean="0"/>
+          </a:p>
+          <a:p>
+            <a:pPr lvl="1"/>
+            <a:r>
+              <a:rPr lang="en-US" dirty="0" smtClean="0"/>
+              <a:t>Chromatin accessibility</a:t>
             </a:r>
             <a:endParaRPr lang="en-US" dirty="0"/>
           </a:p>
           <a:p>
-            <a:pPr lvl="2"/>
-            <a:r>
-              <a:rPr lang="en-US" dirty="0" smtClean="0"/>
-              <a:t>Heritable</a:t>
-            </a:r>
-          </a:p>
-          <a:p>
-            <a:pPr lvl="1"/>
-            <a:r>
-              <a:rPr lang="en-US" dirty="0" smtClean="0"/>
-              <a:t>Reversibility: TET family</a:t>
-            </a:r>
-          </a:p>
-          <a:p>
-            <a:pPr lvl="2"/>
-            <a:r>
-              <a:rPr lang="en-US" dirty="0" smtClean="0"/>
-              <a:t>Research to be done into 5mC derivatives</a:t>
-            </a:r>
+            <a:r>
+              <a:rPr lang="en-US" dirty="0" smtClean="0"/>
+              <a:t>Core protein variants</a:t>
+            </a:r>
+            <a:endParaRPr lang="en-US" dirty="0"/>
+          </a:p>
+          <a:p>
             <a:endParaRPr lang="en-US" dirty="0"/>
           </a:p>
         </p:txBody>
       </p:sp>
       <p:pic>
         <p:nvPicPr>
-          <p:cNvPr id="8" name="Picture 7" descr="methylation_processes.jpg"/>
+          <p:cNvPr id="4" name="Picture 3" descr="histone_modifications.gif"/>
           <p:cNvPicPr>
             <a:picLocks noChangeAspect="1"/>
           </p:cNvPicPr>
@@ -5371,8 +5725,8 @@
         </p:blipFill>
         <p:spPr>
           <a:xfrm>
-            <a:off x="4637983" y="1742651"/>
-            <a:ext cx="3953568" cy="4200950"/>
+            <a:off x="1461105" y="1754002"/>
+            <a:ext cx="5854700" cy="2336800"/>
           </a:xfrm>
           <a:prstGeom prst="rect">
             <a:avLst/>
@@ -5382,7 +5736,7 @@
     </p:spTree>
     <p:extLst>
       <p:ext uri="{BB962C8B-B14F-4D97-AF65-F5344CB8AC3E}">
-        <p14:creationId xmlns:p14="http://schemas.microsoft.com/office/powerpoint/2010/main" val="2830265040"/>
+        <p14:creationId xmlns:p14="http://schemas.microsoft.com/office/powerpoint/2010/main" val="2882511342"/>
       </p:ext>
     </p:extLst>
   </p:cSld>
@@ -5419,27 +5773,22 @@
             <p:ph type="title"/>
           </p:nvPr>
         </p:nvSpPr>
-        <p:spPr>
-          <a:xfrm>
-            <a:off x="221494" y="147681"/>
-            <a:ext cx="8726853" cy="1104863"/>
-          </a:xfrm>
-        </p:spPr>
+        <p:spPr/>
         <p:txBody>
           <a:bodyPr/>
           <a:lstStyle/>
           <a:p>
             <a:r>
-              <a:rPr lang="en-US" sz="4000" dirty="0" smtClean="0"/>
-              <a:t>Methylation and rat brain gender</a:t>
-            </a:r>
-            <a:endParaRPr lang="en-US" sz="4000" dirty="0"/>
-          </a:p>
-        </p:txBody>
-      </p:sp>
-      <p:sp>
-        <p:nvSpPr>
-          <p:cNvPr id="3" name="Content Placeholder 2"/>
+              <a:rPr lang="en-US" sz="4400" dirty="0" smtClean="0"/>
+              <a:t>DNA Methylation, specifically</a:t>
+            </a:r>
+            <a:endParaRPr lang="en-US" sz="4400" dirty="0"/>
+          </a:p>
+        </p:txBody>
+      </p:sp>
+      <p:sp>
+        <p:nvSpPr>
+          <p:cNvPr id="5" name="Content Placeholder 4"/>
           <p:cNvSpPr>
             <a:spLocks noGrp="1"/>
           </p:cNvSpPr>
@@ -5449,25 +5798,73 @@
         </p:nvSpPr>
         <p:spPr>
           <a:xfrm>
-            <a:off x="549275" y="1600201"/>
-            <a:ext cx="3540976" cy="4343400"/>
-          </a:xfrm>
-        </p:spPr>
-        <p:txBody>
-          <a:bodyPr/>
-          <a:lstStyle/>
-          <a:p>
-            <a:r>
-              <a:rPr lang="en-US" dirty="0" err="1" smtClean="0"/>
-              <a:t>Jks</a:t>
-            </a:r>
-            <a:r>
-              <a:rPr lang="en-US" dirty="0" smtClean="0"/>
-              <a:t> </a:t>
-            </a:r>
-            <a:r>
-              <a:rPr lang="en-US" dirty="0" err="1" smtClean="0"/>
-              <a:t>vd</a:t>
+            <a:off x="416379" y="1600201"/>
+            <a:ext cx="4412185" cy="4343400"/>
+          </a:xfrm>
+        </p:spPr>
+        <p:txBody>
+          <a:bodyPr>
+            <a:normAutofit fontScale="92500" lnSpcReduction="10000"/>
+          </a:bodyPr>
+          <a:lstStyle/>
+          <a:p>
+            <a:r>
+              <a:rPr lang="en-US" dirty="0"/>
+              <a:t>Much of mature genome is methylated</a:t>
+            </a:r>
+          </a:p>
+          <a:p>
+            <a:pPr lvl="1"/>
+            <a:r>
+              <a:rPr lang="en-US" dirty="0"/>
+              <a:t>Interest in epigenetic landscape during development</a:t>
+            </a:r>
+          </a:p>
+          <a:p>
+            <a:pPr lvl="1"/>
+            <a:r>
+              <a:rPr lang="en-US" dirty="0"/>
+              <a:t>Methylation changes are maintained/stable (DNMT)</a:t>
+            </a:r>
+          </a:p>
+          <a:p>
+            <a:pPr lvl="2"/>
+            <a:r>
+              <a:rPr lang="en-US" dirty="0"/>
+              <a:t>De </a:t>
+            </a:r>
+            <a:r>
+              <a:rPr lang="en-US" dirty="0" smtClean="0"/>
+              <a:t>novo: DNMT3A/B</a:t>
+            </a:r>
+          </a:p>
+          <a:p>
+            <a:pPr lvl="2"/>
+            <a:r>
+              <a:rPr lang="en-US" dirty="0" smtClean="0"/>
+              <a:t>Maintenance: DNMT1</a:t>
+            </a:r>
+            <a:endParaRPr lang="en-US" dirty="0"/>
+          </a:p>
+          <a:p>
+            <a:pPr lvl="2"/>
+            <a:r>
+              <a:rPr lang="en-US" dirty="0" smtClean="0"/>
+              <a:t>Heritable</a:t>
+            </a:r>
+          </a:p>
+          <a:p>
+            <a:pPr lvl="1"/>
+            <a:r>
+              <a:rPr lang="en-US" dirty="0" smtClean="0"/>
+              <a:t>Reversibility: TET family</a:t>
+            </a:r>
+          </a:p>
+          <a:p>
+            <a:pPr lvl="2"/>
+            <a:r>
+              <a:rPr lang="en-US" dirty="0" smtClean="0"/>
+              <a:t>Research to be done into 5mC derivatives</a:t>
             </a:r>
             <a:endParaRPr lang="en-US" dirty="0"/>
           </a:p>
@@ -5475,7 +5872,7 @@
       </p:sp>
       <p:pic>
         <p:nvPicPr>
-          <p:cNvPr id="5" name="Picture 4" descr="rat.gif"/>
+          <p:cNvPr id="8" name="Picture 7" descr="methylation_processes.jpg"/>
           <p:cNvPicPr>
             <a:picLocks noChangeAspect="1"/>
           </p:cNvPicPr>
@@ -5495,69 +5892,8 @@
         </p:blipFill>
         <p:spPr>
           <a:xfrm>
-            <a:off x="6418311" y="1600201"/>
-            <a:ext cx="1879720" cy="1309142"/>
-          </a:xfrm>
-          <a:prstGeom prst="rect">
-            <a:avLst/>
-          </a:prstGeom>
-        </p:spPr>
-      </p:pic>
-      <p:pic>
-        <p:nvPicPr>
-          <p:cNvPr id="6" name="Picture 5" descr="brain.png"/>
-          <p:cNvPicPr>
-            <a:picLocks noChangeAspect="1"/>
-          </p:cNvPicPr>
-          <p:nvPr/>
-        </p:nvPicPr>
-        <p:blipFill>
-          <a:blip r:embed="rId3">
-            <a:extLst>
-              <a:ext uri="{28A0092B-C50C-407E-A947-70E740481C1C}">
-                <a14:useLocalDpi xmlns:a14="http://schemas.microsoft.com/office/drawing/2010/main" val="0"/>
-              </a:ext>
-            </a:extLst>
-          </a:blip>
-          <a:stretch>
-            <a:fillRect/>
-          </a:stretch>
-        </p:blipFill>
-        <p:spPr>
-          <a:xfrm>
-            <a:off x="6418311" y="3075725"/>
-            <a:ext cx="1879720" cy="1351049"/>
-          </a:xfrm>
-          <a:prstGeom prst="rect">
-            <a:avLst/>
-          </a:prstGeom>
-        </p:spPr>
-      </p:pic>
-      <p:pic>
-        <p:nvPicPr>
-          <p:cNvPr id="7" name="Picture 6" descr="male_female_symbols.jpg"/>
-          <p:cNvPicPr>
-            <a:picLocks noChangeAspect="1"/>
-          </p:cNvPicPr>
-          <p:nvPr/>
-        </p:nvPicPr>
-        <p:blipFill>
-          <a:blip r:embed="rId4">
-            <a:alphaModFix/>
-            <a:extLst>
-              <a:ext uri="{28A0092B-C50C-407E-A947-70E740481C1C}">
-                <a14:useLocalDpi xmlns:a14="http://schemas.microsoft.com/office/drawing/2010/main" val="0"/>
-              </a:ext>
-            </a:extLst>
-          </a:blip>
-          <a:stretch>
-            <a:fillRect/>
-          </a:stretch>
-        </p:blipFill>
-        <p:spPr>
-          <a:xfrm>
-            <a:off x="6376342" y="4702877"/>
-            <a:ext cx="1921689" cy="1300343"/>
+            <a:off x="4637983" y="1742651"/>
+            <a:ext cx="3953568" cy="4200950"/>
           </a:xfrm>
           <a:prstGeom prst="rect">
             <a:avLst/>
@@ -5567,7 +5903,7 @@
     </p:spTree>
     <p:extLst>
       <p:ext uri="{BB962C8B-B14F-4D97-AF65-F5344CB8AC3E}">
-        <p14:creationId xmlns:p14="http://schemas.microsoft.com/office/powerpoint/2010/main" val="2826141436"/>
+        <p14:creationId xmlns:p14="http://schemas.microsoft.com/office/powerpoint/2010/main" val="2830265040"/>
       </p:ext>
     </p:extLst>
   </p:cSld>
@@ -5606,8 +5942,8 @@
         </p:nvSpPr>
         <p:spPr>
           <a:xfrm>
-            <a:off x="549275" y="107576"/>
-            <a:ext cx="8042276" cy="1336956"/>
+            <a:off x="221494" y="147681"/>
+            <a:ext cx="8726853" cy="1104863"/>
           </a:xfrm>
         </p:spPr>
         <p:txBody>
@@ -5615,10 +5951,10 @@
           <a:lstStyle/>
           <a:p>
             <a:r>
-              <a:rPr lang="en-US" sz="3400" dirty="0" smtClean="0"/>
-              <a:t>Effect of PCBs on autism candidate genes via epigenetic marks</a:t>
-            </a:r>
-            <a:endParaRPr lang="en-US" sz="3400" dirty="0"/>
+              <a:rPr lang="en-US" sz="4000" dirty="0" smtClean="0"/>
+              <a:t>Methylation and rat brain gender</a:t>
+            </a:r>
+            <a:endParaRPr lang="en-US" sz="4000" dirty="0"/>
           </a:p>
         </p:txBody>
       </p:sp>
@@ -5632,19 +5968,149 @@
             <p:ph idx="1"/>
           </p:nvPr>
         </p:nvSpPr>
-        <p:spPr/>
-        <p:txBody>
-          <a:bodyPr/>
-          <a:lstStyle/>
-          <a:p>
-            <a:endParaRPr lang="en-US"/>
-          </a:p>
-        </p:txBody>
-      </p:sp>
+        <p:spPr>
+          <a:xfrm>
+            <a:off x="549275" y="1600201"/>
+            <a:ext cx="3540976" cy="4343400"/>
+          </a:xfrm>
+        </p:spPr>
+        <p:txBody>
+          <a:bodyPr>
+            <a:normAutofit/>
+          </a:bodyPr>
+          <a:lstStyle/>
+          <a:p>
+            <a:r>
+              <a:rPr lang="en-US" dirty="0" smtClean="0"/>
+              <a:t>Neuronal </a:t>
+            </a:r>
+            <a:r>
+              <a:rPr lang="en-US" dirty="0" err="1" smtClean="0"/>
+              <a:t>methylome</a:t>
+            </a:r>
+            <a:r>
+              <a:rPr lang="en-US" dirty="0" smtClean="0"/>
+              <a:t> particularly dynamic</a:t>
+            </a:r>
+          </a:p>
+          <a:p>
+            <a:r>
+              <a:rPr lang="en-US" dirty="0" smtClean="0"/>
+              <a:t>Methylation suppresses expression of </a:t>
+            </a:r>
+            <a:r>
+              <a:rPr lang="en-US" dirty="0" err="1" smtClean="0"/>
+              <a:t>maculinizing</a:t>
+            </a:r>
+            <a:r>
+              <a:rPr lang="en-US" dirty="0" smtClean="0"/>
+              <a:t> genes.</a:t>
+            </a:r>
+          </a:p>
+          <a:p>
+            <a:r>
+              <a:rPr lang="en-US" dirty="0" smtClean="0"/>
+              <a:t>Ongoing methylation maintenance is required.</a:t>
+            </a:r>
+            <a:endParaRPr lang="en-US" dirty="0"/>
+          </a:p>
+        </p:txBody>
+      </p:sp>
+      <p:pic>
+        <p:nvPicPr>
+          <p:cNvPr id="5" name="Picture 4" descr="rat.gif"/>
+          <p:cNvPicPr>
+            <a:picLocks noChangeAspect="1"/>
+          </p:cNvPicPr>
+          <p:nvPr/>
+        </p:nvPicPr>
+        <p:blipFill>
+          <a:blip r:embed="rId2">
+            <a:extLst>
+              <a:ext uri="{28A0092B-C50C-407E-A947-70E740481C1C}">
+                <a14:useLocalDpi xmlns:a14="http://schemas.microsoft.com/office/drawing/2010/main" val="0"/>
+              </a:ext>
+            </a:extLst>
+          </a:blip>
+          <a:stretch>
+            <a:fillRect/>
+          </a:stretch>
+        </p:blipFill>
+        <p:spPr>
+          <a:xfrm>
+            <a:off x="6418311" y="1600201"/>
+            <a:ext cx="1879720" cy="1309142"/>
+          </a:xfrm>
+          <a:prstGeom prst="rect">
+            <a:avLst/>
+          </a:prstGeom>
+        </p:spPr>
+      </p:pic>
+      <p:pic>
+        <p:nvPicPr>
+          <p:cNvPr id="6" name="Picture 5" descr="brain.png"/>
+          <p:cNvPicPr>
+            <a:picLocks noChangeAspect="1"/>
+          </p:cNvPicPr>
+          <p:nvPr/>
+        </p:nvPicPr>
+        <p:blipFill>
+          <a:blip r:embed="rId3">
+            <a:extLst>
+              <a:ext uri="{28A0092B-C50C-407E-A947-70E740481C1C}">
+                <a14:useLocalDpi xmlns:a14="http://schemas.microsoft.com/office/drawing/2010/main" val="0"/>
+              </a:ext>
+            </a:extLst>
+          </a:blip>
+          <a:stretch>
+            <a:fillRect/>
+          </a:stretch>
+        </p:blipFill>
+        <p:spPr>
+          <a:xfrm>
+            <a:off x="6418311" y="3075725"/>
+            <a:ext cx="1879720" cy="1351049"/>
+          </a:xfrm>
+          <a:prstGeom prst="rect">
+            <a:avLst/>
+          </a:prstGeom>
+        </p:spPr>
+      </p:pic>
+      <p:pic>
+        <p:nvPicPr>
+          <p:cNvPr id="7" name="Picture 6" descr="male_female_symbols.jpg"/>
+          <p:cNvPicPr>
+            <a:picLocks noChangeAspect="1"/>
+          </p:cNvPicPr>
+          <p:nvPr/>
+        </p:nvPicPr>
+        <p:blipFill>
+          <a:blip r:embed="rId4">
+            <a:alphaModFix/>
+            <a:extLst>
+              <a:ext uri="{28A0092B-C50C-407E-A947-70E740481C1C}">
+                <a14:useLocalDpi xmlns:a14="http://schemas.microsoft.com/office/drawing/2010/main" val="0"/>
+              </a:ext>
+            </a:extLst>
+          </a:blip>
+          <a:stretch>
+            <a:fillRect/>
+          </a:stretch>
+        </p:blipFill>
+        <p:spPr>
+          <a:xfrm>
+            <a:off x="6376342" y="4702877"/>
+            <a:ext cx="1921689" cy="1300343"/>
+          </a:xfrm>
+          <a:prstGeom prst="rect">
+            <a:avLst/>
+          </a:prstGeom>
+        </p:spPr>
+      </p:pic>
     </p:spTree>
     <p:extLst>
       <p:ext uri="{BB962C8B-B14F-4D97-AF65-F5344CB8AC3E}">
-        <p14:creationId xmlns:p14="http://schemas.microsoft.com/office/powerpoint/2010/main" val="2731857222"/>
+        <p14:creationId xmlns:p14="http://schemas.microsoft.com/office/powerpoint/2010/main" val="2826141436"/>
       </p:ext>
     </p:extLst>
   </p:cSld>
@@ -5681,49 +6147,136 @@
             <p:ph type="title"/>
           </p:nvPr>
         </p:nvSpPr>
-        <p:spPr/>
+        <p:spPr>
+          <a:xfrm>
+            <a:off x="549275" y="107576"/>
+            <a:ext cx="8042276" cy="1336956"/>
+          </a:xfrm>
+        </p:spPr>
         <p:txBody>
           <a:bodyPr/>
           <a:lstStyle/>
           <a:p>
             <a:r>
-              <a:rPr lang="en-US" dirty="0" smtClean="0"/>
-              <a:t>Bisulfite Sequencing</a:t>
-            </a:r>
+              <a:rPr lang="en-US" sz="3400" dirty="0" smtClean="0"/>
+              <a:t>Effect of PCBs on autism candidate genes via epigenetic marks</a:t>
+            </a:r>
+            <a:endParaRPr lang="en-US" sz="3400" dirty="0"/>
+          </a:p>
+        </p:txBody>
+      </p:sp>
+      <p:sp>
+        <p:nvSpPr>
+          <p:cNvPr id="7" name="Content Placeholder 6"/>
+          <p:cNvSpPr>
+            <a:spLocks noGrp="1"/>
+          </p:cNvSpPr>
+          <p:nvPr>
+            <p:ph idx="1"/>
+          </p:nvPr>
+        </p:nvSpPr>
+        <p:spPr>
+          <a:xfrm>
+            <a:off x="162430" y="1600201"/>
+            <a:ext cx="4105016" cy="4343400"/>
+          </a:xfrm>
+        </p:spPr>
+        <p:txBody>
+          <a:bodyPr>
+            <a:normAutofit lnSpcReduction="10000"/>
+          </a:bodyPr>
+          <a:lstStyle/>
+          <a:p>
+            <a:r>
+              <a:rPr lang="en-US" dirty="0"/>
+              <a:t>C</a:t>
+            </a:r>
+            <a:r>
+              <a:rPr lang="en-US" dirty="0" smtClean="0"/>
+              <a:t>ell line to model neuronal function and differentiation (</a:t>
+            </a:r>
+            <a:r>
+              <a:rPr lang="en-US" dirty="0"/>
+              <a:t>SH-</a:t>
+            </a:r>
+            <a:r>
+              <a:rPr lang="en-US" dirty="0" smtClean="0"/>
+              <a:t>SY5Y)</a:t>
+            </a:r>
+          </a:p>
+          <a:p>
+            <a:pPr lvl="1"/>
+            <a:r>
+              <a:rPr lang="en-US" dirty="0" smtClean="0"/>
+              <a:t>10 or 40 days</a:t>
+            </a:r>
+          </a:p>
+          <a:p>
+            <a:pPr lvl="1"/>
+            <a:r>
+              <a:rPr lang="en-US" dirty="0" smtClean="0"/>
+              <a:t>+/- Dup15q</a:t>
+            </a:r>
+          </a:p>
+          <a:p>
+            <a:pPr lvl="1"/>
+            <a:r>
+              <a:rPr lang="en-US" dirty="0" smtClean="0"/>
+              <a:t>+/- PCB</a:t>
+            </a:r>
+          </a:p>
+          <a:p>
+            <a:r>
+              <a:rPr lang="en-US" dirty="0" smtClean="0"/>
+              <a:t>Methylation profile partitions with respect to structural chromosome aberration</a:t>
+            </a:r>
+          </a:p>
+          <a:p>
+            <a:pPr lvl="1"/>
+            <a:endParaRPr lang="en-US" dirty="0" smtClean="0"/>
+          </a:p>
+          <a:p>
+            <a:pPr lvl="2"/>
+            <a:endParaRPr lang="en-US" dirty="0" smtClean="0"/>
+          </a:p>
+          <a:p>
             <a:endParaRPr lang="en-US" dirty="0"/>
           </a:p>
         </p:txBody>
       </p:sp>
-      <p:sp>
-        <p:nvSpPr>
-          <p:cNvPr id="3" name="Content Placeholder 2"/>
-          <p:cNvSpPr>
-            <a:spLocks noGrp="1"/>
-          </p:cNvSpPr>
-          <p:nvPr>
-            <p:ph idx="1"/>
-          </p:nvPr>
-        </p:nvSpPr>
-        <p:spPr/>
-        <p:txBody>
-          <a:bodyPr/>
-          <a:lstStyle/>
-          <a:p>
-            <a:r>
-              <a:rPr lang="en-US" dirty="0" smtClean="0"/>
-              <a:t>Conversion efficiency</a:t>
-            </a:r>
-          </a:p>
-          <a:p>
-            <a:pPr lvl="1"/>
-            <a:endParaRPr lang="en-US" dirty="0"/>
-          </a:p>
-        </p:txBody>
-      </p:sp>
+      <p:pic>
+        <p:nvPicPr>
+          <p:cNvPr id="11" name="Picture 10" descr="pwd-asd-1.jpg"/>
+          <p:cNvPicPr>
+            <a:picLocks noChangeAspect="1"/>
+          </p:cNvPicPr>
+          <p:nvPr/>
+        </p:nvPicPr>
+        <p:blipFill rotWithShape="1">
+          <a:blip r:embed="rId2">
+            <a:extLst>
+              <a:ext uri="{28A0092B-C50C-407E-A947-70E740481C1C}">
+                <a14:useLocalDpi xmlns:a14="http://schemas.microsoft.com/office/drawing/2010/main" val="0"/>
+              </a:ext>
+            </a:extLst>
+          </a:blip>
+          <a:srcRect b="44016"/>
+          <a:stretch/>
+        </p:blipFill>
+        <p:spPr>
+          <a:xfrm>
+            <a:off x="4581259" y="2294308"/>
+            <a:ext cx="4308024" cy="2431528"/>
+          </a:xfrm>
+          <a:prstGeom prst="rect">
+            <a:avLst/>
+          </a:prstGeom>
+        </p:spPr>
+      </p:pic>
     </p:spTree>
     <p:extLst>
       <p:ext uri="{BB962C8B-B14F-4D97-AF65-F5344CB8AC3E}">
-        <p14:creationId xmlns:p14="http://schemas.microsoft.com/office/powerpoint/2010/main" val="474749496"/>
+        <p14:creationId xmlns:p14="http://schemas.microsoft.com/office/powerpoint/2010/main" val="2731857222"/>
       </p:ext>
     </p:extLst>
   </p:cSld>

</xml_diff>

<commit_message>
add pres and conf file
</commit_message>
<xml_diff>
--- a/KipnisLabMeeting_2017-03-13.pptx
+++ b/KipnisLabMeeting_2017-03-13.pptx
@@ -18,8 +18,9 @@
     <p:sldId id="262" r:id="rId12"/>
     <p:sldId id="275" r:id="rId13"/>
     <p:sldId id="273" r:id="rId14"/>
-    <p:sldId id="268" r:id="rId15"/>
-    <p:sldId id="276" r:id="rId16"/>
+    <p:sldId id="277" r:id="rId15"/>
+    <p:sldId id="268" r:id="rId16"/>
+    <p:sldId id="276" r:id="rId17"/>
   </p:sldIdLst>
   <p:sldSz cx="9144000" cy="6858000" type="screen4x3"/>
   <p:notesSz cx="6858000" cy="9144000"/>
@@ -3695,7 +3696,7 @@
           <a:p>
             <a:r>
               <a:rPr lang="en-US" dirty="0" smtClean="0"/>
-              <a:t>Computational Epigenetics: Processing, Applications, &amp; Methods</a:t>
+              <a:t>Epigenetics Processing, Applications, &amp; Methods</a:t>
             </a:r>
             <a:endParaRPr lang="en-US" dirty="0"/>
           </a:p>
@@ -3777,6 +3778,13 @@
   <p:clrMapOvr>
     <a:masterClrMapping/>
   </p:clrMapOvr>
+  <p:timing>
+    <p:tnLst>
+      <p:par>
+        <p:cTn xmlns:p14="http://schemas.microsoft.com/office/powerpoint/2010/main" id="1" dur="indefinite" restart="never" nodeType="tmRoot"/>
+      </p:par>
+    </p:tnLst>
+  </p:timing>
 </p:sld>
 </file>
 
@@ -3837,7 +3845,7 @@
         </p:nvSpPr>
         <p:spPr>
           <a:xfrm>
-            <a:off x="549275" y="4194179"/>
+            <a:off x="549275" y="4400934"/>
             <a:ext cx="7719825" cy="1521129"/>
           </a:xfrm>
         </p:spPr>
@@ -3849,7 +3857,7 @@
           <a:p>
             <a:r>
               <a:rPr lang="en-US" dirty="0" smtClean="0"/>
-              <a:t>Inclusion of brain tissue from Down Syndrome</a:t>
+              <a:t>Imprinting</a:t>
             </a:r>
           </a:p>
           <a:p>
@@ -3860,8 +3868,12 @@
           </a:p>
           <a:p>
             <a:r>
-              <a:rPr lang="en-US" dirty="0" smtClean="0"/>
-              <a:t>Imprinting</a:t>
+              <a:rPr lang="en-US" dirty="0"/>
+              <a:t>Inclusion of brain tissue from Down </a:t>
+            </a:r>
+            <a:r>
+              <a:rPr lang="en-US" dirty="0" smtClean="0"/>
+              <a:t>Syndrome</a:t>
             </a:r>
             <a:endParaRPr lang="en-US" dirty="0"/>
           </a:p>
@@ -3888,8 +3900,8 @@
         </p:blipFill>
         <p:spPr>
           <a:xfrm>
-            <a:off x="1535690" y="1600200"/>
-            <a:ext cx="5467473" cy="2301717"/>
+            <a:off x="1289988" y="1600200"/>
+            <a:ext cx="6417993" cy="2701870"/>
           </a:xfrm>
           <a:prstGeom prst="rect">
             <a:avLst/>
@@ -3906,6 +3918,13 @@
   <p:clrMapOvr>
     <a:masterClrMapping/>
   </p:clrMapOvr>
+  <p:timing>
+    <p:tnLst>
+      <p:par>
+        <p:cTn xmlns:p14="http://schemas.microsoft.com/office/powerpoint/2010/main" id="1" dur="indefinite" restart="never" nodeType="tmRoot"/>
+      </p:par>
+    </p:tnLst>
+  </p:timing>
 </p:sld>
 </file>
 
@@ -4048,8 +4067,8 @@
         </p:blipFill>
         <p:spPr>
           <a:xfrm>
-            <a:off x="1033637" y="1990957"/>
-            <a:ext cx="6655428" cy="2464153"/>
+            <a:off x="1033636" y="1772189"/>
+            <a:ext cx="7246301" cy="2682922"/>
           </a:xfrm>
           <a:prstGeom prst="rect">
             <a:avLst/>
@@ -4066,6 +4085,13 @@
   <p:clrMapOvr>
     <a:masterClrMapping/>
   </p:clrMapOvr>
+  <p:timing>
+    <p:tnLst>
+      <p:par>
+        <p:cTn xmlns:p14="http://schemas.microsoft.com/office/powerpoint/2010/main" id="1" dur="indefinite" restart="never" nodeType="tmRoot"/>
+      </p:par>
+    </p:tnLst>
+  </p:timing>
 </p:sld>
 </file>
 
@@ -4355,6 +4381,13 @@
   <p:clrMapOvr>
     <a:masterClrMapping/>
   </p:clrMapOvr>
+  <p:timing>
+    <p:tnLst>
+      <p:par>
+        <p:cTn xmlns:p14="http://schemas.microsoft.com/office/powerpoint/2010/main" id="1" dur="indefinite" restart="never" nodeType="tmRoot"/>
+      </p:par>
+    </p:tnLst>
+  </p:timing>
 </p:sld>
 </file>
 
@@ -4405,18 +4438,18 @@
             <a:spLocks noGrp="1"/>
           </p:cNvSpPr>
           <p:nvPr>
-            <p:ph idx="1"/>
-          </p:nvPr>
-        </p:nvSpPr>
-        <p:spPr>
-          <a:xfrm>
-            <a:off x="549275" y="1733115"/>
-            <a:ext cx="3851067" cy="4343400"/>
+            <p:ph sz="half" idx="1"/>
+          </p:nvPr>
+        </p:nvSpPr>
+        <p:spPr>
+          <a:xfrm>
+            <a:off x="549275" y="1801723"/>
+            <a:ext cx="3230885" cy="2274309"/>
           </a:xfrm>
         </p:spPr>
         <p:txBody>
           <a:bodyPr>
-            <a:normAutofit fontScale="92500" lnSpcReduction="10000"/>
+            <a:normAutofit lnSpcReduction="10000"/>
           </a:bodyPr>
           <a:lstStyle/>
           <a:p>
@@ -4457,46 +4490,100 @@
             <a:pPr lvl="1"/>
             <a:r>
               <a:rPr lang="en-US" dirty="0" smtClean="0"/>
-              <a:t>Condition/phenotype</a:t>
-            </a:r>
-          </a:p>
-          <a:p>
-            <a:r>
-              <a:rPr lang="en-US" dirty="0" smtClean="0"/>
+              <a:t>Condition or phenotype</a:t>
+            </a:r>
+          </a:p>
+        </p:txBody>
+      </p:sp>
+      <p:sp>
+        <p:nvSpPr>
+          <p:cNvPr id="6" name="Content Placeholder 5"/>
+          <p:cNvSpPr>
+            <a:spLocks noGrp="1"/>
+          </p:cNvSpPr>
+          <p:nvPr>
+            <p:ph sz="half" idx="2"/>
+          </p:nvPr>
+        </p:nvSpPr>
+        <p:spPr>
+          <a:xfrm>
+            <a:off x="549275" y="4223712"/>
+            <a:ext cx="3840480" cy="2274309"/>
+          </a:xfrm>
+        </p:spPr>
+        <p:txBody>
+          <a:bodyPr>
+            <a:normAutofit lnSpcReduction="10000"/>
+          </a:bodyPr>
+          <a:lstStyle/>
+          <a:p>
+            <a:r>
+              <a:rPr lang="en-US" dirty="0"/>
               <a:t>Steps</a:t>
             </a:r>
           </a:p>
           <a:p>
             <a:pPr lvl="1"/>
             <a:r>
-              <a:rPr lang="en-US" dirty="0" smtClean="0"/>
+              <a:rPr lang="en-US" dirty="0"/>
               <a:t>Filter/trim</a:t>
             </a:r>
           </a:p>
           <a:p>
             <a:pPr lvl="1"/>
             <a:r>
-              <a:rPr lang="en-US" dirty="0" smtClean="0"/>
+              <a:rPr lang="en-US" dirty="0"/>
               <a:t>Align</a:t>
             </a:r>
           </a:p>
           <a:p>
             <a:pPr lvl="1"/>
             <a:r>
-              <a:rPr lang="en-US" dirty="0" smtClean="0"/>
-              <a:t>Call methylation</a:t>
+              <a:rPr lang="en-US" dirty="0"/>
+              <a:t>Call</a:t>
             </a:r>
           </a:p>
           <a:p>
             <a:pPr lvl="1"/>
             <a:r>
-              <a:rPr lang="en-US" dirty="0" smtClean="0"/>
-              <a:t>Further analysis</a:t>
-            </a:r>
+              <a:rPr lang="en-US" dirty="0"/>
+              <a:t>Analyze</a:t>
+            </a:r>
+          </a:p>
+          <a:p>
             <a:endParaRPr lang="en-US" dirty="0"/>
           </a:p>
         </p:txBody>
       </p:sp>
+      <p:pic>
+        <p:nvPicPr>
+          <p:cNvPr id="7" name="Picture 6" descr="methclone-1.jpg"/>
+          <p:cNvPicPr>
+            <a:picLocks noChangeAspect="1"/>
+          </p:cNvPicPr>
+          <p:nvPr/>
+        </p:nvPicPr>
+        <p:blipFill rotWithShape="1">
+          <a:blip r:embed="rId2">
+            <a:extLst>
+              <a:ext uri="{28A0092B-C50C-407E-A947-70E740481C1C}">
+                <a14:useLocalDpi xmlns:a14="http://schemas.microsoft.com/office/drawing/2010/main" val="0"/>
+              </a:ext>
+            </a:extLst>
+          </a:blip>
+          <a:srcRect l="9123" t="4092" r="6298" b="56070"/>
+          <a:stretch/>
+        </p:blipFill>
+        <p:spPr>
+          <a:xfrm>
+            <a:off x="3335611" y="2407222"/>
+            <a:ext cx="5586895" cy="2355682"/>
+          </a:xfrm>
+          <a:prstGeom prst="rect">
+            <a:avLst/>
+          </a:prstGeom>
+        </p:spPr>
+      </p:pic>
     </p:spTree>
     <p:extLst>
       <p:ext uri="{BB962C8B-B14F-4D97-AF65-F5344CB8AC3E}">
@@ -4507,6 +4594,13 @@
   <p:clrMapOvr>
     <a:masterClrMapping/>
   </p:clrMapOvr>
+  <p:timing>
+    <p:tnLst>
+      <p:par>
+        <p:cTn xmlns:p14="http://schemas.microsoft.com/office/powerpoint/2010/main" id="1" dur="indefinite" restart="never" nodeType="tmRoot"/>
+      </p:par>
+    </p:tnLst>
+  </p:timing>
 </p:sld>
 </file>
 
@@ -4527,156 +4621,68 @@
           <a:chExt cx="0" cy="0"/>
         </a:xfrm>
       </p:grpSpPr>
-      <p:sp>
-        <p:nvSpPr>
-          <p:cNvPr id="2" name="Title 1"/>
-          <p:cNvSpPr>
-            <a:spLocks noGrp="1"/>
-          </p:cNvSpPr>
-          <p:nvPr>
-            <p:ph type="title"/>
-          </p:nvPr>
-        </p:nvSpPr>
-        <p:spPr/>
-        <p:txBody>
-          <a:bodyPr/>
-          <a:lstStyle/>
-          <a:p>
-            <a:r>
-              <a:rPr lang="en-US" dirty="0" smtClean="0"/>
-              <a:t>Epilog</a:t>
-            </a:r>
-            <a:endParaRPr lang="en-US" dirty="0"/>
-          </a:p>
-        </p:txBody>
-      </p:sp>
-      <p:sp>
-        <p:nvSpPr>
-          <p:cNvPr id="7" name="Content Placeholder 6"/>
-          <p:cNvSpPr>
-            <a:spLocks noGrp="1"/>
-          </p:cNvSpPr>
-          <p:nvPr>
-            <p:ph idx="1"/>
-          </p:nvPr>
-        </p:nvSpPr>
-        <p:spPr/>
-        <p:txBody>
-          <a:bodyPr>
-            <a:normAutofit fontScale="62500" lnSpcReduction="20000"/>
-          </a:bodyPr>
-          <a:lstStyle/>
-          <a:p>
-            <a:r>
-              <a:rPr lang="en-US" dirty="0" smtClean="0"/>
-              <a:t>Current capabilities</a:t>
-            </a:r>
-          </a:p>
-          <a:p>
-            <a:r>
-              <a:rPr lang="en-US" dirty="0" smtClean="0"/>
-              <a:t>Ideas for development</a:t>
-            </a:r>
-          </a:p>
-          <a:p>
-            <a:pPr lvl="1"/>
-            <a:r>
-              <a:rPr lang="en-US" dirty="0" err="1" smtClean="0"/>
-              <a:t>Methclone</a:t>
-            </a:r>
-            <a:r>
-              <a:rPr lang="en-US" dirty="0" smtClean="0"/>
-              <a:t>-like, but more flexible</a:t>
-            </a:r>
-          </a:p>
-          <a:p>
-            <a:pPr lvl="2"/>
-            <a:r>
-              <a:rPr lang="en-US" dirty="0" err="1" smtClean="0"/>
-              <a:t>Epipolymorphism</a:t>
-            </a:r>
-            <a:endParaRPr lang="en-US" dirty="0" smtClean="0"/>
-          </a:p>
-          <a:p>
-            <a:pPr lvl="2"/>
-            <a:r>
-              <a:rPr lang="en-US" dirty="0" smtClean="0"/>
-              <a:t>Combinatorial entropy</a:t>
-            </a:r>
-          </a:p>
-          <a:p>
-            <a:r>
-              <a:rPr lang="en-US" dirty="0" smtClean="0"/>
-              <a:t>Deterministic vs. stochastic evolution of methylation accumulation susceptibility is associated with CTCF occupancy and histone modification (connect to brief overview of histone modification.) (“Epigenetic </a:t>
-            </a:r>
-            <a:r>
-              <a:rPr lang="en-US" dirty="0" err="1" smtClean="0"/>
-              <a:t>polymporphism</a:t>
-            </a:r>
-            <a:r>
-              <a:rPr lang="en-US" dirty="0" smtClean="0"/>
-              <a:t> and stochastic formation</a:t>
-            </a:r>
-            <a:r>
-              <a:rPr lang="is-IS" dirty="0" smtClean="0"/>
-              <a:t>….”</a:t>
-            </a:r>
-            <a:r>
-              <a:rPr lang="en-US" dirty="0" smtClean="0"/>
-              <a:t>)</a:t>
-            </a:r>
-          </a:p>
-          <a:p>
-            <a:r>
-              <a:rPr lang="en-US" dirty="0" smtClean="0"/>
-              <a:t>ESCs and </a:t>
-            </a:r>
-            <a:r>
-              <a:rPr lang="en-US" dirty="0" err="1" smtClean="0"/>
-              <a:t>germline</a:t>
-            </a:r>
-            <a:r>
-              <a:rPr lang="en-US" dirty="0" smtClean="0"/>
-              <a:t> cells able to establish stable methylation program rather than random changes seen in somatic cells (“Epigenetic </a:t>
-            </a:r>
-            <a:r>
-              <a:rPr lang="en-US" dirty="0" err="1" smtClean="0"/>
-              <a:t>polymporphism</a:t>
-            </a:r>
-            <a:r>
-              <a:rPr lang="is-IS" dirty="0" smtClean="0"/>
-              <a:t>…</a:t>
-            </a:r>
-            <a:r>
-              <a:rPr lang="en-US" dirty="0" smtClean="0"/>
-              <a:t>”)</a:t>
-            </a:r>
-            <a:endParaRPr lang="en-US" dirty="0"/>
-          </a:p>
-          <a:p>
-            <a:r>
-              <a:rPr lang="en-US" dirty="0" smtClean="0"/>
-              <a:t>Applications</a:t>
-            </a:r>
-          </a:p>
-          <a:p>
-            <a:pPr lvl="1"/>
-            <a:r>
-              <a:rPr lang="en-US" dirty="0" err="1" smtClean="0"/>
-              <a:t>Epiallelic</a:t>
-            </a:r>
-            <a:r>
-              <a:rPr lang="en-US" dirty="0" smtClean="0"/>
-              <a:t> composition across time scales in brain regions/cell types/times/conditions</a:t>
-            </a:r>
-            <a:endParaRPr lang="en-US" dirty="0"/>
-          </a:p>
-        </p:txBody>
-      </p:sp>
+      <p:pic>
+        <p:nvPicPr>
+          <p:cNvPr id="4" name="Picture 3" descr="epipolymporphism.jpg"/>
+          <p:cNvPicPr>
+            <a:picLocks noChangeAspect="1"/>
+          </p:cNvPicPr>
+          <p:nvPr/>
+        </p:nvPicPr>
+        <p:blipFill rotWithShape="1">
+          <a:blip r:embed="rId2">
+            <a:extLst>
+              <a:ext uri="{28A0092B-C50C-407E-A947-70E740481C1C}">
+                <a14:useLocalDpi xmlns:a14="http://schemas.microsoft.com/office/drawing/2010/main" val="0"/>
+              </a:ext>
+            </a:extLst>
+          </a:blip>
+          <a:srcRect l="4595" b="74729"/>
+          <a:stretch/>
+        </p:blipFill>
+        <p:spPr>
+          <a:xfrm>
+            <a:off x="1896532" y="453288"/>
+            <a:ext cx="5161737" cy="2020541"/>
+          </a:xfrm>
+          <a:prstGeom prst="rect">
+            <a:avLst/>
+          </a:prstGeom>
+        </p:spPr>
+      </p:pic>
+      <p:pic>
+        <p:nvPicPr>
+          <p:cNvPr id="6" name="Picture 5" descr="methclone-2.jpg"/>
+          <p:cNvPicPr>
+            <a:picLocks noChangeAspect="1"/>
+          </p:cNvPicPr>
+          <p:nvPr/>
+        </p:nvPicPr>
+        <p:blipFill rotWithShape="1">
+          <a:blip r:embed="rId3">
+            <a:extLst>
+              <a:ext uri="{28A0092B-C50C-407E-A947-70E740481C1C}">
+                <a14:useLocalDpi xmlns:a14="http://schemas.microsoft.com/office/drawing/2010/main" val="0"/>
+              </a:ext>
+            </a:extLst>
+          </a:blip>
+          <a:srcRect t="9609"/>
+          <a:stretch/>
+        </p:blipFill>
+        <p:spPr>
+          <a:xfrm>
+            <a:off x="1172986" y="2728737"/>
+            <a:ext cx="6602377" cy="3905585"/>
+          </a:xfrm>
+          <a:prstGeom prst="rect">
+            <a:avLst/>
+          </a:prstGeom>
+        </p:spPr>
+      </p:pic>
     </p:spTree>
     <p:extLst>
       <p:ext uri="{BB962C8B-B14F-4D97-AF65-F5344CB8AC3E}">
-        <p14:creationId xmlns:p14="http://schemas.microsoft.com/office/powerpoint/2010/main" val="2796789836"/>
+        <p14:creationId xmlns:p14="http://schemas.microsoft.com/office/powerpoint/2010/main" val="525339625"/>
       </p:ext>
     </p:extLst>
   </p:cSld>
@@ -4715,6 +4721,216 @@
         </p:nvSpPr>
         <p:spPr>
           <a:xfrm>
+            <a:off x="549275" y="280591"/>
+            <a:ext cx="8042276" cy="1119631"/>
+          </a:xfrm>
+        </p:spPr>
+        <p:txBody>
+          <a:bodyPr/>
+          <a:lstStyle/>
+          <a:p>
+            <a:r>
+              <a:rPr lang="en-US" dirty="0" smtClean="0"/>
+              <a:t>Improvements: Epilog</a:t>
+            </a:r>
+            <a:endParaRPr lang="en-US" dirty="0"/>
+          </a:p>
+        </p:txBody>
+      </p:sp>
+      <p:sp>
+        <p:nvSpPr>
+          <p:cNvPr id="7" name="Content Placeholder 6"/>
+          <p:cNvSpPr>
+            <a:spLocks noGrp="1"/>
+          </p:cNvSpPr>
+          <p:nvPr>
+            <p:ph idx="1"/>
+          </p:nvPr>
+        </p:nvSpPr>
+        <p:spPr>
+          <a:xfrm>
+            <a:off x="549275" y="1600200"/>
+            <a:ext cx="8042276" cy="4809215"/>
+          </a:xfrm>
+        </p:spPr>
+        <p:txBody>
+          <a:bodyPr>
+            <a:normAutofit fontScale="77500" lnSpcReduction="20000"/>
+          </a:bodyPr>
+          <a:lstStyle/>
+          <a:p>
+            <a:r>
+              <a:rPr lang="en-US" dirty="0" smtClean="0"/>
+              <a:t>Current tools</a:t>
+            </a:r>
+          </a:p>
+          <a:p>
+            <a:pPr lvl="1"/>
+            <a:r>
+              <a:rPr lang="en-US" dirty="0" smtClean="0"/>
+              <a:t>Often consider </a:t>
+            </a:r>
+            <a:r>
+              <a:rPr lang="en-US" dirty="0" err="1" smtClean="0"/>
+              <a:t>CpG</a:t>
+            </a:r>
+            <a:r>
+              <a:rPr lang="en-US" dirty="0" smtClean="0"/>
+              <a:t> in groups of 4</a:t>
+            </a:r>
+          </a:p>
+          <a:p>
+            <a:pPr lvl="1"/>
+            <a:r>
+              <a:rPr lang="en-US" dirty="0" smtClean="0"/>
+              <a:t>Groups/sites analyzed independently</a:t>
+            </a:r>
+          </a:p>
+          <a:p>
+            <a:r>
+              <a:rPr lang="en-US" dirty="0" smtClean="0"/>
+              <a:t>Instead</a:t>
+            </a:r>
+          </a:p>
+          <a:p>
+            <a:pPr lvl="1"/>
+            <a:r>
+              <a:rPr lang="en-US" dirty="0" smtClean="0"/>
+              <a:t>Allow flexibility in terms of base count</a:t>
+            </a:r>
+          </a:p>
+          <a:p>
+            <a:pPr lvl="1"/>
+            <a:r>
+              <a:rPr lang="en-US" dirty="0" smtClean="0"/>
+              <a:t>Investigate specific </a:t>
+            </a:r>
+            <a:r>
+              <a:rPr lang="en-US" dirty="0" err="1" smtClean="0"/>
+              <a:t>epiallele</a:t>
+            </a:r>
+            <a:r>
+              <a:rPr lang="en-US" dirty="0" smtClean="0"/>
+              <a:t> patterns</a:t>
+            </a:r>
+          </a:p>
+          <a:p>
+            <a:pPr lvl="1"/>
+            <a:r>
+              <a:rPr lang="en-US" dirty="0" smtClean="0"/>
+              <a:t>Spatial autocorrelation</a:t>
+            </a:r>
+          </a:p>
+          <a:p>
+            <a:r>
+              <a:rPr lang="en-US" dirty="0" smtClean="0"/>
+              <a:t>Pairings</a:t>
+            </a:r>
+          </a:p>
+          <a:p>
+            <a:pPr lvl="1"/>
+            <a:r>
+              <a:rPr lang="en-US" dirty="0" smtClean="0"/>
+              <a:t>ATAC-</a:t>
+            </a:r>
+            <a:r>
+              <a:rPr lang="en-US" dirty="0" err="1" smtClean="0"/>
+              <a:t>Seq</a:t>
+            </a:r>
+            <a:endParaRPr lang="en-US" dirty="0" smtClean="0"/>
+          </a:p>
+          <a:p>
+            <a:pPr lvl="2"/>
+            <a:r>
+              <a:rPr lang="en-US" sz="2200" dirty="0" smtClean="0"/>
+              <a:t>Hyperactive </a:t>
+            </a:r>
+            <a:r>
+              <a:rPr lang="en-US" sz="2200" dirty="0" err="1" smtClean="0"/>
+              <a:t>transposase</a:t>
+            </a:r>
+            <a:endParaRPr lang="en-US" sz="2200" dirty="0" smtClean="0"/>
+          </a:p>
+          <a:p>
+            <a:pPr lvl="2"/>
+            <a:r>
+              <a:rPr lang="en-US" sz="2200" dirty="0" smtClean="0"/>
+              <a:t>Assesses DNA not nucleosome-bound, free of binding proteins</a:t>
+            </a:r>
+          </a:p>
+          <a:p>
+            <a:pPr lvl="1"/>
+            <a:r>
+              <a:rPr lang="en-US" dirty="0" err="1" smtClean="0"/>
+              <a:t>ChIP-Seq</a:t>
+            </a:r>
+            <a:endParaRPr lang="en-US" dirty="0"/>
+          </a:p>
+          <a:p>
+            <a:pPr lvl="2"/>
+            <a:r>
+              <a:rPr lang="en-US" sz="2200" dirty="0" smtClean="0"/>
+              <a:t>Histone modifications</a:t>
+            </a:r>
+          </a:p>
+          <a:p>
+            <a:pPr lvl="2"/>
+            <a:r>
+              <a:rPr lang="en-US" sz="2200" dirty="0" smtClean="0"/>
+              <a:t>Epigenetic regulatory interactions</a:t>
+            </a:r>
+          </a:p>
+        </p:txBody>
+      </p:sp>
+    </p:spTree>
+    <p:extLst>
+      <p:ext uri="{BB962C8B-B14F-4D97-AF65-F5344CB8AC3E}">
+        <p14:creationId xmlns:p14="http://schemas.microsoft.com/office/powerpoint/2010/main" val="2796789836"/>
+      </p:ext>
+    </p:extLst>
+  </p:cSld>
+  <p:clrMapOvr>
+    <a:masterClrMapping/>
+  </p:clrMapOvr>
+  <p:timing>
+    <p:tnLst>
+      <p:par>
+        <p:cTn xmlns:p14="http://schemas.microsoft.com/office/powerpoint/2010/main" id="1" dur="indefinite" restart="never" nodeType="tmRoot"/>
+      </p:par>
+    </p:tnLst>
+  </p:timing>
+</p:sld>
+</file>
+
+<file path=ppt/slides/slide16.xml><?xml version="1.0" encoding="utf-8"?>
+<p:sld xmlns:a="http://schemas.openxmlformats.org/drawingml/2006/main" xmlns:r="http://schemas.openxmlformats.org/officeDocument/2006/relationships" xmlns:p="http://schemas.openxmlformats.org/presentationml/2006/main">
+  <p:cSld>
+    <p:spTree>
+      <p:nvGrpSpPr>
+        <p:cNvPr id="1" name=""/>
+        <p:cNvGrpSpPr/>
+        <p:nvPr/>
+      </p:nvGrpSpPr>
+      <p:grpSpPr>
+        <a:xfrm>
+          <a:off x="0" y="0"/>
+          <a:ext cx="0" cy="0"/>
+          <a:chOff x="0" y="0"/>
+          <a:chExt cx="0" cy="0"/>
+        </a:xfrm>
+      </p:grpSpPr>
+      <p:sp>
+        <p:nvSpPr>
+          <p:cNvPr id="2" name="Title 1"/>
+          <p:cNvSpPr>
+            <a:spLocks noGrp="1"/>
+          </p:cNvSpPr>
+          <p:nvPr>
+            <p:ph type="title"/>
+          </p:nvPr>
+        </p:nvSpPr>
+        <p:spPr>
+          <a:xfrm>
             <a:off x="549274" y="4311280"/>
             <a:ext cx="8042276" cy="1336956"/>
           </a:xfrm>
@@ -4771,6 +4987,13 @@
   <p:clrMapOvr>
     <a:masterClrMapping/>
   </p:clrMapOvr>
+  <p:timing>
+    <p:tnLst>
+      <p:par>
+        <p:cTn xmlns:p14="http://schemas.microsoft.com/office/powerpoint/2010/main" id="1" dur="indefinite" restart="never" nodeType="tmRoot"/>
+      </p:par>
+    </p:tnLst>
+  </p:timing>
 </p:sld>
 </file>
 
@@ -4828,17 +5051,19 @@
         </p:nvSpPr>
         <p:spPr>
           <a:xfrm>
-            <a:off x="0" y="1600200"/>
-            <a:ext cx="4178849" cy="4343400"/>
-          </a:xfrm>
-        </p:spPr>
-        <p:txBody>
-          <a:bodyPr/>
-          <a:lstStyle/>
-          <a:p>
-            <a:r>
-              <a:rPr lang="en-US" dirty="0" smtClean="0"/>
-              <a:t>Starts small, manual</a:t>
+            <a:off x="147663" y="1816493"/>
+            <a:ext cx="3927822" cy="4127106"/>
+          </a:xfrm>
+        </p:spPr>
+        <p:txBody>
+          <a:bodyPr>
+            <a:normAutofit lnSpcReduction="10000"/>
+          </a:bodyPr>
+          <a:lstStyle/>
+          <a:p>
+            <a:r>
+              <a:rPr lang="en-US" dirty="0" smtClean="0"/>
+              <a:t>Starts small &amp;manual</a:t>
             </a:r>
           </a:p>
           <a:p>
@@ -4850,7 +5075,7 @@
           <a:p>
             <a:r>
               <a:rPr lang="en-US" dirty="0" smtClean="0"/>
-              <a:t>More tools, more chaos </a:t>
+              <a:t>Add tools, add chaos </a:t>
             </a:r>
           </a:p>
           <a:p>
@@ -4973,6 +5198,13 @@
   <p:clrMapOvr>
     <a:masterClrMapping/>
   </p:clrMapOvr>
+  <p:timing>
+    <p:tnLst>
+      <p:par>
+        <p:cTn xmlns:p14="http://schemas.microsoft.com/office/powerpoint/2010/main" id="1" dur="indefinite" restart="never" nodeType="tmRoot"/>
+      </p:par>
+    </p:tnLst>
+  </p:timing>
 </p:sld>
 </file>
 
@@ -5246,6 +5478,13 @@
   <p:clrMapOvr>
     <a:masterClrMapping/>
   </p:clrMapOvr>
+  <p:timing>
+    <p:tnLst>
+      <p:par>
+        <p:cTn xmlns:p14="http://schemas.microsoft.com/office/powerpoint/2010/main" id="1" dur="indefinite" restart="never" nodeType="tmRoot"/>
+      </p:par>
+    </p:tnLst>
+  </p:timing>
 </p:sld>
 </file>
 
@@ -5278,8 +5517,8 @@
         </p:nvSpPr>
         <p:spPr>
           <a:xfrm>
-            <a:off x="206726" y="107576"/>
-            <a:ext cx="8653023" cy="1336956"/>
+            <a:off x="324857" y="177219"/>
+            <a:ext cx="8591551" cy="957180"/>
           </a:xfrm>
         </p:spPr>
         <p:txBody>
@@ -5302,22 +5541,140 @@
           </a:p>
         </p:txBody>
       </p:sp>
-      <p:sp>
-        <p:nvSpPr>
-          <p:cNvPr id="3" name="Content Placeholder 2"/>
-          <p:cNvSpPr>
-            <a:spLocks noGrp="1"/>
-          </p:cNvSpPr>
-          <p:nvPr>
-            <p:ph idx="1"/>
-          </p:nvPr>
-        </p:nvSpPr>
-        <p:spPr/>
-        <p:txBody>
-          <a:bodyPr/>
-          <a:lstStyle/>
-          <a:p>
-            <a:endParaRPr lang="en-US"/>
+      <p:pic>
+        <p:nvPicPr>
+          <p:cNvPr id="4" name="Picture 3" descr="sample-anns.png"/>
+          <p:cNvPicPr>
+            <a:picLocks noChangeAspect="1"/>
+          </p:cNvPicPr>
+          <p:nvPr/>
+        </p:nvPicPr>
+        <p:blipFill rotWithShape="1">
+          <a:blip r:embed="rId2">
+            <a:extLst>
+              <a:ext uri="{28A0092B-C50C-407E-A947-70E740481C1C}">
+                <a14:useLocalDpi xmlns:a14="http://schemas.microsoft.com/office/drawing/2010/main" val="0"/>
+              </a:ext>
+            </a:extLst>
+          </a:blip>
+          <a:srcRect/>
+          <a:stretch/>
+        </p:blipFill>
+        <p:spPr>
+          <a:xfrm>
+            <a:off x="3660345" y="1435577"/>
+            <a:ext cx="5256063" cy="3747108"/>
+          </a:xfrm>
+          <a:prstGeom prst="rect">
+            <a:avLst/>
+          </a:prstGeom>
+        </p:spPr>
+      </p:pic>
+      <p:pic>
+        <p:nvPicPr>
+          <p:cNvPr id="5" name="Picture 4" descr="conf.png"/>
+          <p:cNvPicPr>
+            <a:picLocks noChangeAspect="1"/>
+          </p:cNvPicPr>
+          <p:nvPr/>
+        </p:nvPicPr>
+        <p:blipFill>
+          <a:blip r:embed="rId3">
+            <a:extLst>
+              <a:ext uri="{28A0092B-C50C-407E-A947-70E740481C1C}">
+                <a14:useLocalDpi xmlns:a14="http://schemas.microsoft.com/office/drawing/2010/main" val="0"/>
+              </a:ext>
+            </a:extLst>
+          </a:blip>
+          <a:stretch>
+            <a:fillRect/>
+          </a:stretch>
+        </p:blipFill>
+        <p:spPr>
+          <a:xfrm>
+            <a:off x="193039" y="1435577"/>
+            <a:ext cx="3158899" cy="3747108"/>
+          </a:xfrm>
+          <a:prstGeom prst="rect">
+            <a:avLst/>
+          </a:prstGeom>
+        </p:spPr>
+      </p:pic>
+      <p:sp>
+        <p:nvSpPr>
+          <p:cNvPr id="6" name="TextBox 5"/>
+          <p:cNvSpPr txBox="1"/>
+          <p:nvPr/>
+        </p:nvSpPr>
+        <p:spPr>
+          <a:xfrm>
+            <a:off x="324857" y="5353423"/>
+            <a:ext cx="2745445" cy="369332"/>
+          </a:xfrm>
+          <a:prstGeom prst="rect">
+            <a:avLst/>
+          </a:prstGeom>
+          <a:noFill/>
+        </p:spPr>
+        <p:txBody>
+          <a:bodyPr wrap="square" rtlCol="0">
+            <a:spAutoFit/>
+          </a:bodyPr>
+          <a:lstStyle/>
+          <a:p>
+            <a:pPr algn="ctr"/>
+            <a:r>
+              <a:rPr lang="en-US" dirty="0" smtClean="0">
+                <a:solidFill>
+                  <a:schemeClr val="accent1"/>
+                </a:solidFill>
+              </a:rPr>
+              <a:t>Project configuration</a:t>
+            </a:r>
+            <a:endParaRPr lang="en-US" dirty="0">
+              <a:solidFill>
+                <a:schemeClr val="accent1"/>
+              </a:solidFill>
+            </a:endParaRPr>
+          </a:p>
+        </p:txBody>
+      </p:sp>
+      <p:sp>
+        <p:nvSpPr>
+          <p:cNvPr id="7" name="TextBox 6"/>
+          <p:cNvSpPr txBox="1"/>
+          <p:nvPr/>
+        </p:nvSpPr>
+        <p:spPr>
+          <a:xfrm>
+            <a:off x="3809692" y="5353423"/>
+            <a:ext cx="4739966" cy="369332"/>
+          </a:xfrm>
+          <a:prstGeom prst="rect">
+            <a:avLst/>
+          </a:prstGeom>
+          <a:noFill/>
+        </p:spPr>
+        <p:txBody>
+          <a:bodyPr wrap="square" rtlCol="0">
+            <a:spAutoFit/>
+          </a:bodyPr>
+          <a:lstStyle/>
+          <a:p>
+            <a:pPr algn="ctr"/>
+            <a:r>
+              <a:rPr lang="en-US" dirty="0" smtClean="0">
+                <a:solidFill>
+                  <a:srgbClr val="2C7C9F"/>
+                </a:solidFill>
+              </a:rPr>
+              <a:t>Sample annotations</a:t>
+            </a:r>
+            <a:endParaRPr lang="en-US" dirty="0">
+              <a:solidFill>
+                <a:srgbClr val="2C7C9F"/>
+              </a:solidFill>
+            </a:endParaRPr>
           </a:p>
         </p:txBody>
       </p:sp>
@@ -5331,6 +5688,13 @@
   <p:clrMapOvr>
     <a:masterClrMapping/>
   </p:clrMapOvr>
+  <p:timing>
+    <p:tnLst>
+      <p:par>
+        <p:cTn xmlns:p14="http://schemas.microsoft.com/office/powerpoint/2010/main" id="1" dur="indefinite" restart="never" nodeType="tmRoot"/>
+      </p:par>
+    </p:tnLst>
+  </p:timing>
 </p:sld>
 </file>
 
@@ -5386,8 +5750,8 @@
         </p:nvSpPr>
         <p:spPr>
           <a:xfrm>
-            <a:off x="205471" y="1444533"/>
-            <a:ext cx="3840480" cy="2388356"/>
+            <a:off x="384789" y="1550663"/>
+            <a:ext cx="3840480" cy="2282225"/>
           </a:xfrm>
         </p:spPr>
         <p:txBody>
@@ -5405,7 +5769,7 @@
             <a:pPr lvl="1"/>
             <a:r>
               <a:rPr lang="en-US" dirty="0" smtClean="0"/>
-              <a:t>Development and </a:t>
+              <a:t>Development/differentiation</a:t>
             </a:r>
           </a:p>
           <a:p>
@@ -5419,7 +5783,7 @@
             <a:pPr lvl="1"/>
             <a:r>
               <a:rPr lang="en-US" dirty="0" smtClean="0"/>
-              <a:t>Development/differentiation</a:t>
+              <a:t>Environmental response</a:t>
             </a:r>
           </a:p>
           <a:p>
@@ -5440,8 +5804,8 @@
         </p:nvSpPr>
         <p:spPr>
           <a:xfrm>
-            <a:off x="4751071" y="3440999"/>
-            <a:ext cx="3840480" cy="2605979"/>
+            <a:off x="5002097" y="3832889"/>
+            <a:ext cx="3840480" cy="2214089"/>
           </a:xfrm>
         </p:spPr>
         <p:txBody>
@@ -5471,32 +5835,14 @@
             </a:r>
           </a:p>
           <a:p>
-            <a:pPr lvl="2"/>
+            <a:pPr lvl="1"/>
+            <a:r>
+              <a:rPr lang="en-US" dirty="0" smtClean="0"/>
+              <a:t>Histone </a:t>
+            </a:r>
             <a:r>
               <a:rPr lang="en-US" dirty="0"/>
-              <a:t>Methylation</a:t>
-            </a:r>
-          </a:p>
-          <a:p>
-            <a:pPr lvl="2"/>
-            <a:r>
-              <a:rPr lang="en-US" dirty="0"/>
-              <a:t>Acetylation</a:t>
-            </a:r>
-          </a:p>
-          <a:p>
-            <a:pPr lvl="2"/>
-            <a:r>
-              <a:rPr lang="en-US" dirty="0" err="1"/>
-              <a:t>Ubiquitination</a:t>
-            </a:r>
-            <a:endParaRPr lang="en-US" dirty="0"/>
-          </a:p>
-          <a:p>
-            <a:pPr lvl="1"/>
-            <a:r>
-              <a:rPr lang="en-US" dirty="0"/>
-              <a:t>Histone protein variants</a:t>
+              <a:t>protein variants</a:t>
             </a:r>
           </a:p>
           <a:p>
@@ -5574,6 +5920,13 @@
   <p:clrMapOvr>
     <a:masterClrMapping/>
   </p:clrMapOvr>
+  <p:timing>
+    <p:tnLst>
+      <p:par>
+        <p:cTn xmlns:p14="http://schemas.microsoft.com/office/powerpoint/2010/main" id="1" dur="indefinite" restart="never" nodeType="tmRoot"/>
+      </p:par>
+    </p:tnLst>
+  </p:timing>
 </p:sld>
 </file>
 
@@ -5725,8 +6078,8 @@
         </p:blipFill>
         <p:spPr>
           <a:xfrm>
-            <a:off x="1461105" y="1754002"/>
-            <a:ext cx="5854700" cy="2336800"/>
+            <a:off x="1461104" y="1685877"/>
+            <a:ext cx="6025383" cy="2404925"/>
           </a:xfrm>
           <a:prstGeom prst="rect">
             <a:avLst/>
@@ -5743,6 +6096,13 @@
   <p:clrMapOvr>
     <a:masterClrMapping/>
   </p:clrMapOvr>
+  <p:timing>
+    <p:tnLst>
+      <p:par>
+        <p:cTn xmlns:p14="http://schemas.microsoft.com/office/powerpoint/2010/main" id="1" dur="indefinite" restart="never" nodeType="tmRoot"/>
+      </p:par>
+    </p:tnLst>
+  </p:timing>
 </p:sld>
 </file>
 
@@ -5892,8 +6252,8 @@
         </p:blipFill>
         <p:spPr>
           <a:xfrm>
-            <a:off x="4637983" y="1742651"/>
-            <a:ext cx="3953568" cy="4200950"/>
+            <a:off x="4637982" y="1742650"/>
+            <a:ext cx="4398963" cy="4674215"/>
           </a:xfrm>
           <a:prstGeom prst="rect">
             <a:avLst/>
@@ -5910,6 +6270,13 @@
   <p:clrMapOvr>
     <a:masterClrMapping/>
   </p:clrMapOvr>
+  <p:timing>
+    <p:tnLst>
+      <p:par>
+        <p:cTn xmlns:p14="http://schemas.microsoft.com/office/powerpoint/2010/main" id="1" dur="indefinite" restart="never" nodeType="tmRoot"/>
+      </p:par>
+    </p:tnLst>
+  </p:timing>
 </p:sld>
 </file>
 
@@ -5970,13 +6337,13 @@
         </p:nvSpPr>
         <p:spPr>
           <a:xfrm>
-            <a:off x="549275" y="1600201"/>
-            <a:ext cx="3540976" cy="4343400"/>
+            <a:off x="428221" y="1600200"/>
+            <a:ext cx="5182953" cy="4883055"/>
           </a:xfrm>
         </p:spPr>
         <p:txBody>
           <a:bodyPr>
-            <a:normAutofit/>
+            <a:normAutofit fontScale="77500" lnSpcReduction="20000"/>
           </a:bodyPr>
           <a:lstStyle/>
           <a:p>
@@ -5990,7 +6357,7 @@
             </a:r>
             <a:r>
               <a:rPr lang="en-US" dirty="0" smtClean="0"/>
-              <a:t> particularly dynamic</a:t>
+              <a:t> particularly dynamic.</a:t>
             </a:r>
           </a:p>
           <a:p>
@@ -6010,7 +6377,72 @@
           <a:p>
             <a:r>
               <a:rPr lang="en-US" dirty="0" smtClean="0"/>
-              <a:t>Ongoing methylation maintenance is required.</a:t>
+              <a:t>Ongoing methylation maintenance is required (DNMT1).</a:t>
+            </a:r>
+          </a:p>
+          <a:p>
+            <a:r>
+              <a:rPr lang="en-US" dirty="0" smtClean="0"/>
+              <a:t>Estradiol treatment sharply cuts proportion of fully-methylated </a:t>
+            </a:r>
+            <a:r>
+              <a:rPr lang="en-US" dirty="0" err="1" smtClean="0"/>
+              <a:t>CpG</a:t>
+            </a:r>
+            <a:r>
+              <a:rPr lang="en-US" dirty="0" smtClean="0"/>
+              <a:t> sites.</a:t>
+            </a:r>
+          </a:p>
+          <a:p>
+            <a:r>
+              <a:rPr lang="en-US" dirty="0" smtClean="0"/>
+              <a:t>Timing is important</a:t>
+            </a:r>
+          </a:p>
+          <a:p>
+            <a:pPr lvl="1"/>
+            <a:r>
+              <a:rPr lang="en-US" dirty="0" smtClean="0"/>
+              <a:t>Knockout of DNMT3a is slow, little effect</a:t>
+            </a:r>
+          </a:p>
+          <a:p>
+            <a:pPr lvl="1"/>
+            <a:r>
+              <a:rPr lang="en-US" dirty="0" smtClean="0"/>
+              <a:t>Hormonal treatment differential</a:t>
+            </a:r>
+          </a:p>
+          <a:p>
+            <a:pPr lvl="1"/>
+            <a:r>
+              <a:rPr lang="en-US" dirty="0" smtClean="0"/>
+              <a:t>DNMT inhibition with </a:t>
+            </a:r>
+            <a:r>
+              <a:rPr lang="en-US" dirty="0" err="1" smtClean="0"/>
+              <a:t>Zeb</a:t>
+            </a:r>
+            <a:r>
+              <a:rPr lang="en-US" dirty="0" smtClean="0"/>
+              <a:t> still elevates masculine protein proxy (</a:t>
+            </a:r>
+            <a:r>
+              <a:rPr lang="en-US" dirty="0" err="1" smtClean="0"/>
+              <a:t>spinophilin</a:t>
+            </a:r>
+            <a:r>
+              <a:rPr lang="en-US" dirty="0" smtClean="0"/>
+              <a:t> </a:t>
+            </a:r>
+            <a:r>
+              <a:rPr lang="en-US" dirty="0" err="1" smtClean="0"/>
+              <a:t>Neurabin</a:t>
+            </a:r>
+            <a:r>
+              <a:rPr lang="en-US" dirty="0" smtClean="0"/>
+              <a:t> II)</a:t>
             </a:r>
             <a:endParaRPr lang="en-US" dirty="0"/>
           </a:p>
@@ -6117,6 +6549,13 @@
   <p:clrMapOvr>
     <a:masterClrMapping/>
   </p:clrMapOvr>
+  <p:timing>
+    <p:tnLst>
+      <p:par>
+        <p:cTn xmlns:p14="http://schemas.microsoft.com/office/powerpoint/2010/main" id="1" dur="indefinite" restart="never" nodeType="tmRoot"/>
+      </p:par>
+    </p:tnLst>
+  </p:timing>
 </p:sld>
 </file>
 
@@ -6265,8 +6704,8 @@
         </p:blipFill>
         <p:spPr>
           <a:xfrm>
-            <a:off x="4581259" y="2294308"/>
-            <a:ext cx="4308024" cy="2431528"/>
+            <a:off x="4048682" y="1993712"/>
+            <a:ext cx="4840601" cy="2732124"/>
           </a:xfrm>
           <a:prstGeom prst="rect">
             <a:avLst/>
@@ -6283,6 +6722,13 @@
   <p:clrMapOvr>
     <a:masterClrMapping/>
   </p:clrMapOvr>
+  <p:timing>
+    <p:tnLst>
+      <p:par>
+        <p:cTn xmlns:p14="http://schemas.microsoft.com/office/powerpoint/2010/main" id="1" dur="indefinite" restart="never" nodeType="tmRoot"/>
+      </p:par>
+    </p:tnLst>
+  </p:timing>
 </p:sld>
 </file>
 

</xml_diff>